<commit_message>
Updated the ideas and created UVP
</commit_message>
<xml_diff>
--- a/Bachelorseminar/Vortrag.pptx
+++ b/Bachelorseminar/Vortrag.pptx
@@ -5043,8 +5043,20 @@
           </a:p>
           <a:p>
             <a:r>
+              <a:rPr lang="en-US" dirty="0" err="1"/>
+              <a:t>Moodlekurs</a:t>
+            </a:r>
+            <a:r>
               <a:rPr lang="en-US" dirty="0"/>
-              <a:t>Related work</a:t>
+              <a:t> (</a:t>
+            </a:r>
+            <a:r>
+              <a:rPr lang="en-US" dirty="0" err="1"/>
+              <a:t>UndiMeS</a:t>
+            </a:r>
+            <a:r>
+              <a:rPr lang="en-US" dirty="0"/>
+              <a:t>)</a:t>
             </a:r>
           </a:p>
           <a:p>
@@ -5056,9 +5068,18 @@
           </a:p>
           <a:p>
             <a:r>
+              <a:rPr lang="en-US" dirty="0" err="1"/>
+              <a:t>Lern</a:t>
+            </a:r>
+            <a:r>
               <a:rPr lang="en-US" dirty="0"/>
-              <a:t>Experimental Setup</a:t>
-            </a:r>
+              <a:t>- und </a:t>
+            </a:r>
+            <a:r>
+              <a:rPr lang="en-US" dirty="0" err="1"/>
+              <a:t>Kompetenz-Ziele</a:t>
+            </a:r>
+            <a:endParaRPr lang="en-US" dirty="0"/>
           </a:p>
           <a:p>
             <a:r>

</xml_diff>

<commit_message>
Changed docx and PowerPoint
</commit_message>
<xml_diff>
--- a/Bachelorseminar/Vortrag.pptx
+++ b/Bachelorseminar/Vortrag.pptx
@@ -6,20 +6,26 @@
     <p:sldMasterId id="2147483881" r:id="rId2"/>
   </p:sldMasterIdLst>
   <p:notesMasterIdLst>
-    <p:notesMasterId r:id="rId11"/>
+    <p:notesMasterId r:id="rId17"/>
   </p:notesMasterIdLst>
   <p:handoutMasterIdLst>
-    <p:handoutMasterId r:id="rId12"/>
+    <p:handoutMasterId r:id="rId18"/>
   </p:handoutMasterIdLst>
   <p:sldIdLst>
     <p:sldId id="288" r:id="rId3"/>
     <p:sldId id="289" r:id="rId4"/>
     <p:sldId id="290" r:id="rId5"/>
-    <p:sldId id="295" r:id="rId6"/>
-    <p:sldId id="291" r:id="rId7"/>
-    <p:sldId id="292" r:id="rId8"/>
-    <p:sldId id="293" r:id="rId9"/>
-    <p:sldId id="294" r:id="rId10"/>
+    <p:sldId id="301" r:id="rId6"/>
+    <p:sldId id="298" r:id="rId7"/>
+    <p:sldId id="299" r:id="rId8"/>
+    <p:sldId id="302" r:id="rId9"/>
+    <p:sldId id="291" r:id="rId10"/>
+    <p:sldId id="296" r:id="rId11"/>
+    <p:sldId id="292" r:id="rId12"/>
+    <p:sldId id="297" r:id="rId13"/>
+    <p:sldId id="303" r:id="rId14"/>
+    <p:sldId id="293" r:id="rId15"/>
+    <p:sldId id="294" r:id="rId16"/>
   </p:sldIdLst>
   <p:sldSz cx="9144000" cy="5143500" type="screen16x9"/>
   <p:notesSz cx="6858000" cy="9144000"/>
@@ -156,9 +162,15 @@
             <p14:sldId id="288"/>
             <p14:sldId id="289"/>
             <p14:sldId id="290"/>
-            <p14:sldId id="295"/>
+            <p14:sldId id="301"/>
+            <p14:sldId id="298"/>
+            <p14:sldId id="299"/>
+            <p14:sldId id="302"/>
             <p14:sldId id="291"/>
+            <p14:sldId id="296"/>
             <p14:sldId id="292"/>
+            <p14:sldId id="297"/>
+            <p14:sldId id="303"/>
             <p14:sldId id="293"/>
             <p14:sldId id="294"/>
           </p14:sldIdLst>
@@ -300,7 +312,7 @@
               <a:pPr>
                 <a:defRPr/>
               </a:pPr>
-              <a:t>15.01.2024</a:t>
+              <a:t>20.01.2024</a:t>
             </a:fld>
             <a:endParaRPr lang="de-DE" altLang="de-DE" dirty="0">
               <a:latin typeface="Arial" panose="020B0604020202020204" pitchFamily="34" charset="0"/>
@@ -530,7 +542,7 @@
               <a:pPr>
                 <a:defRPr/>
               </a:pPr>
-              <a:t>15.01.2024</a:t>
+              <a:t>20.01.2024</a:t>
             </a:fld>
             <a:endParaRPr lang="de-DE" altLang="de-DE" dirty="0"/>
           </a:p>
@@ -3115,6 +3127,36 @@
 
 <file path=ppt/slideLayouts/slideLayout6.xml><?xml version="1.0" encoding="utf-8"?>
 <p:sldLayout xmlns:a="http://schemas.openxmlformats.org/drawingml/2006/main" xmlns:r="http://schemas.openxmlformats.org/officeDocument/2006/relationships" xmlns:p="http://schemas.openxmlformats.org/presentationml/2006/main" preserve="1" userDrawn="1">
+  <p:cSld name="leer">
+    <p:spTree>
+      <p:nvGrpSpPr>
+        <p:cNvPr id="1" name=""/>
+        <p:cNvGrpSpPr/>
+        <p:nvPr/>
+      </p:nvGrpSpPr>
+      <p:grpSpPr>
+        <a:xfrm>
+          <a:off x="0" y="0"/>
+          <a:ext cx="0" cy="0"/>
+          <a:chOff x="0" y="0"/>
+          <a:chExt cx="0" cy="0"/>
+        </a:xfrm>
+      </p:grpSpPr>
+    </p:spTree>
+    <p:extLst>
+      <p:ext uri="{BB962C8B-B14F-4D97-AF65-F5344CB8AC3E}">
+        <p14:creationId xmlns:p14="http://schemas.microsoft.com/office/powerpoint/2010/main" val="4248048490"/>
+      </p:ext>
+    </p:extLst>
+  </p:cSld>
+  <p:clrMapOvr>
+    <a:masterClrMapping/>
+  </p:clrMapOvr>
+</p:sldLayout>
+</file>
+
+<file path=ppt/slideLayouts/slideLayout7.xml><?xml version="1.0" encoding="utf-8"?>
+<p:sldLayout xmlns:a="http://schemas.openxmlformats.org/drawingml/2006/main" xmlns:r="http://schemas.openxmlformats.org/officeDocument/2006/relationships" xmlns:p="http://schemas.openxmlformats.org/presentationml/2006/main" preserve="1" userDrawn="1">
   <p:cSld name="Titel und Inhalt ohne Untertitel">
     <p:spTree>
       <p:nvGrpSpPr>
@@ -3393,7 +3435,7 @@
 </p:sldLayout>
 </file>
 
-<file path=ppt/slideLayouts/slideLayout7.xml><?xml version="1.0" encoding="utf-8"?>
+<file path=ppt/slideLayouts/slideLayout8.xml><?xml version="1.0" encoding="utf-8"?>
 <p:sldLayout xmlns:a="http://schemas.openxmlformats.org/drawingml/2006/main" xmlns:r="http://schemas.openxmlformats.org/officeDocument/2006/relationships" xmlns:p="http://schemas.openxmlformats.org/presentationml/2006/main" preserve="1" userDrawn="1">
   <p:cSld name="Titel und Inhalt mit Untertitel">
     <p:spTree>
@@ -3847,6 +3889,7 @@
     <p:sldLayoutId id="2147483885" r:id="rId3"/>
     <p:sldLayoutId id="2147483870" r:id="rId4"/>
     <p:sldLayoutId id="2147483879" r:id="rId5"/>
+    <p:sldLayoutId id="2147483886" r:id="rId6"/>
   </p:sldLayoutIdLst>
   <p:hf hdr="0" ftr="0" dt="0"/>
   <p:txStyles>
@@ -4970,6 +5013,1043 @@
 </p:sld>
 </file>
 
+<file path=ppt/slides/slide10.xml><?xml version="1.0" encoding="utf-8"?>
+<p:sld xmlns:a="http://schemas.openxmlformats.org/drawingml/2006/main" xmlns:r="http://schemas.openxmlformats.org/officeDocument/2006/relationships" xmlns:p="http://schemas.openxmlformats.org/presentationml/2006/main">
+  <p:cSld>
+    <p:spTree>
+      <p:nvGrpSpPr>
+        <p:cNvPr id="1" name=""/>
+        <p:cNvGrpSpPr/>
+        <p:nvPr/>
+      </p:nvGrpSpPr>
+      <p:grpSpPr>
+        <a:xfrm>
+          <a:off x="0" y="0"/>
+          <a:ext cx="0" cy="0"/>
+          <a:chOff x="0" y="0"/>
+          <a:chExt cx="0" cy="0"/>
+        </a:xfrm>
+      </p:grpSpPr>
+      <p:sp>
+        <p:nvSpPr>
+          <p:cNvPr id="6" name="Titel 5">
+            <a:extLst>
+              <a:ext uri="{FF2B5EF4-FFF2-40B4-BE49-F238E27FC236}">
+                <a16:creationId xmlns:a16="http://schemas.microsoft.com/office/drawing/2014/main" id="{B7137728-7FAB-64E4-FADB-C920D1D2F2AF}"/>
+              </a:ext>
+            </a:extLst>
+          </p:cNvPr>
+          <p:cNvSpPr>
+            <a:spLocks noGrp="1"/>
+          </p:cNvSpPr>
+          <p:nvPr>
+            <p:ph type="title"/>
+          </p:nvPr>
+        </p:nvSpPr>
+        <p:spPr/>
+        <p:txBody>
+          <a:bodyPr/>
+          <a:lstStyle/>
+          <a:p>
+            <a:r>
+              <a:rPr lang="de-DE" dirty="0"/>
+              <a:t>Lern- und Kompetenzziele</a:t>
+            </a:r>
+          </a:p>
+        </p:txBody>
+      </p:sp>
+      <p:sp>
+        <p:nvSpPr>
+          <p:cNvPr id="7" name="Inhaltsplatzhalter 6">
+            <a:extLst>
+              <a:ext uri="{FF2B5EF4-FFF2-40B4-BE49-F238E27FC236}">
+                <a16:creationId xmlns:a16="http://schemas.microsoft.com/office/drawing/2014/main" id="{E4027CA7-3104-5947-D795-764E28924B7C}"/>
+              </a:ext>
+            </a:extLst>
+          </p:cNvPr>
+          <p:cNvSpPr>
+            <a:spLocks noGrp="1"/>
+          </p:cNvSpPr>
+          <p:nvPr>
+            <p:ph idx="1"/>
+          </p:nvPr>
+        </p:nvSpPr>
+        <p:spPr/>
+        <p:txBody>
+          <a:bodyPr/>
+          <a:lstStyle/>
+          <a:p>
+            <a:pPr marL="0" indent="0">
+              <a:buNone/>
+            </a:pPr>
+            <a:r>
+              <a:rPr lang="de-DE" b="1" dirty="0"/>
+              <a:t>Lernziele:</a:t>
+            </a:r>
+          </a:p>
+          <a:p>
+            <a:r>
+              <a:rPr lang="de-DE" dirty="0"/>
+              <a:t>Die SuS diskutieren die Ergebnisse einer Klassifikationsaufgabe anhand der von </a:t>
+            </a:r>
+            <a:r>
+              <a:rPr lang="de-DE" dirty="0" err="1"/>
+              <a:t>teachable</a:t>
+            </a:r>
+            <a:r>
+              <a:rPr lang="de-DE" dirty="0"/>
+              <a:t> </a:t>
+            </a:r>
+            <a:r>
+              <a:rPr lang="de-DE" dirty="0" err="1"/>
+              <a:t>machine</a:t>
+            </a:r>
+            <a:r>
+              <a:rPr lang="de-DE" dirty="0"/>
+              <a:t> bereitgestellten Faktoren.</a:t>
+            </a:r>
+          </a:p>
+          <a:p>
+            <a:r>
+              <a:rPr lang="de-DE" dirty="0"/>
+              <a:t>Die SuS gewinnen einen Einblick in die Datenverarbeitung, welche für das Training von </a:t>
+            </a:r>
+            <a:r>
+              <a:rPr lang="de-DE" dirty="0" err="1"/>
+              <a:t>KI’s</a:t>
+            </a:r>
+            <a:r>
+              <a:rPr lang="de-DE" dirty="0"/>
+              <a:t> notwendig ist.</a:t>
+            </a:r>
+          </a:p>
+          <a:p>
+            <a:r>
+              <a:rPr lang="de-DE" dirty="0"/>
+              <a:t>Die SuS kennen die Eigenschaften, welche eine gute Datengrundlage für ein möglichst gutes Ergebnis des Trainings haben sollte.</a:t>
+            </a:r>
+          </a:p>
+          <a:p>
+            <a:pPr marL="0" indent="0">
+              <a:buNone/>
+            </a:pPr>
+            <a:endParaRPr lang="de-DE" dirty="0"/>
+          </a:p>
+          <a:p>
+            <a:r>
+              <a:rPr lang="de-DE" dirty="0"/>
+              <a:t>Die SuS arbeiten in Gruppen – </a:t>
+            </a:r>
+            <a:r>
+              <a:rPr lang="de-DE" dirty="0" err="1"/>
+              <a:t>shared</a:t>
+            </a:r>
+            <a:r>
+              <a:rPr lang="de-DE" dirty="0"/>
+              <a:t> </a:t>
+            </a:r>
+            <a:r>
+              <a:rPr lang="de-DE" dirty="0" err="1"/>
+              <a:t>task</a:t>
+            </a:r>
+            <a:r>
+              <a:rPr lang="de-DE" dirty="0"/>
+              <a:t> (affektiv)</a:t>
+            </a:r>
+          </a:p>
+          <a:p>
+            <a:r>
+              <a:rPr lang="de-DE" dirty="0"/>
+              <a:t>Die SuS lernen den Umgang mit Bildverarbeitungssoftware? – nicht, wenn sie das zu Hause machen?</a:t>
+            </a:r>
+          </a:p>
+          <a:p>
+            <a:endParaRPr lang="de-DE" dirty="0"/>
+          </a:p>
+        </p:txBody>
+      </p:sp>
+      <p:sp>
+        <p:nvSpPr>
+          <p:cNvPr id="5" name="Foliennummernplatzhalter 4">
+            <a:extLst>
+              <a:ext uri="{FF2B5EF4-FFF2-40B4-BE49-F238E27FC236}">
+                <a16:creationId xmlns:a16="http://schemas.microsoft.com/office/drawing/2014/main" id="{53A8983A-91A8-51DA-2CFA-5DF6227F9929}"/>
+              </a:ext>
+            </a:extLst>
+          </p:cNvPr>
+          <p:cNvSpPr>
+            <a:spLocks noGrp="1"/>
+          </p:cNvSpPr>
+          <p:nvPr>
+            <p:ph type="sldNum" sz="quarter" idx="4"/>
+          </p:nvPr>
+        </p:nvSpPr>
+        <p:spPr/>
+        <p:txBody>
+          <a:bodyPr/>
+          <a:lstStyle/>
+          <a:p>
+            <a:pPr>
+              <a:defRPr/>
+            </a:pPr>
+            <a:fld id="{248790C2-FB8D-4AD1-BFB1-8D82BB9A4283}" type="slidenum">
+              <a:rPr lang="de-DE" altLang="de-DE" sz="1000" smtClean="0">
+                <a:solidFill>
+                  <a:srgbClr val="D8413E"/>
+                </a:solidFill>
+                <a:latin typeface="Arial" panose="020B0604020202020204" pitchFamily="34" charset="0"/>
+                <a:cs typeface="Arial" panose="020B0604020202020204" pitchFamily="34" charset="0"/>
+              </a:rPr>
+              <a:pPr>
+                <a:defRPr/>
+              </a:pPr>
+              <a:t>10</a:t>
+            </a:fld>
+            <a:endParaRPr lang="de-DE" altLang="de-DE" sz="1000" dirty="0">
+              <a:solidFill>
+                <a:srgbClr val="D8413E"/>
+              </a:solidFill>
+              <a:latin typeface="Arial" panose="020B0604020202020204" pitchFamily="34" charset="0"/>
+              <a:cs typeface="Arial" panose="020B0604020202020204" pitchFamily="34" charset="0"/>
+            </a:endParaRPr>
+          </a:p>
+        </p:txBody>
+      </p:sp>
+    </p:spTree>
+    <p:extLst>
+      <p:ext uri="{BB962C8B-B14F-4D97-AF65-F5344CB8AC3E}">
+        <p14:creationId xmlns:p14="http://schemas.microsoft.com/office/powerpoint/2010/main" val="3104107190"/>
+      </p:ext>
+    </p:extLst>
+  </p:cSld>
+  <p:clrMapOvr>
+    <a:masterClrMapping/>
+  </p:clrMapOvr>
+</p:sld>
+</file>
+
+<file path=ppt/slides/slide11.xml><?xml version="1.0" encoding="utf-8"?>
+<p:sld xmlns:a="http://schemas.openxmlformats.org/drawingml/2006/main" xmlns:r="http://schemas.openxmlformats.org/officeDocument/2006/relationships" xmlns:p="http://schemas.openxmlformats.org/presentationml/2006/main">
+  <p:cSld>
+    <p:spTree>
+      <p:nvGrpSpPr>
+        <p:cNvPr id="1" name=""/>
+        <p:cNvGrpSpPr/>
+        <p:nvPr/>
+      </p:nvGrpSpPr>
+      <p:grpSpPr>
+        <a:xfrm>
+          <a:off x="0" y="0"/>
+          <a:ext cx="0" cy="0"/>
+          <a:chOff x="0" y="0"/>
+          <a:chExt cx="0" cy="0"/>
+        </a:xfrm>
+      </p:grpSpPr>
+      <p:pic>
+        <p:nvPicPr>
+          <p:cNvPr id="11" name="Grafik 10" descr="Ein Bild, das Text, Screenshot, Software, Computersymbol enthält.&#10;&#10;Automatisch generierte Beschreibung">
+            <a:extLst>
+              <a:ext uri="{FF2B5EF4-FFF2-40B4-BE49-F238E27FC236}">
+                <a16:creationId xmlns:a16="http://schemas.microsoft.com/office/drawing/2014/main" id="{CA6A7BDD-24CE-9999-9F91-D547E9DF5500}"/>
+              </a:ext>
+            </a:extLst>
+          </p:cNvPr>
+          <p:cNvPicPr>
+            <a:picLocks noChangeAspect="1"/>
+          </p:cNvPicPr>
+          <p:nvPr/>
+        </p:nvPicPr>
+        <p:blipFill>
+          <a:blip r:embed="rId2"/>
+          <a:stretch>
+            <a:fillRect/>
+          </a:stretch>
+        </p:blipFill>
+        <p:spPr>
+          <a:xfrm>
+            <a:off x="1039954" y="1063624"/>
+            <a:ext cx="7064092" cy="3537752"/>
+          </a:xfrm>
+          <a:prstGeom prst="rect">
+            <a:avLst/>
+          </a:prstGeom>
+        </p:spPr>
+      </p:pic>
+      <p:sp>
+        <p:nvSpPr>
+          <p:cNvPr id="6" name="Titel 5">
+            <a:extLst>
+              <a:ext uri="{FF2B5EF4-FFF2-40B4-BE49-F238E27FC236}">
+                <a16:creationId xmlns:a16="http://schemas.microsoft.com/office/drawing/2014/main" id="{D15349E1-09E3-F349-D43A-589C721855B9}"/>
+              </a:ext>
+            </a:extLst>
+          </p:cNvPr>
+          <p:cNvSpPr>
+            <a:spLocks noGrp="1"/>
+          </p:cNvSpPr>
+          <p:nvPr>
+            <p:ph type="title"/>
+          </p:nvPr>
+        </p:nvSpPr>
+        <p:spPr/>
+        <p:txBody>
+          <a:bodyPr/>
+          <a:lstStyle/>
+          <a:p>
+            <a:r>
+              <a:rPr lang="de-DE" dirty="0" err="1"/>
+              <a:t>Teachable</a:t>
+            </a:r>
+            <a:r>
+              <a:rPr lang="de-DE" dirty="0"/>
+              <a:t> </a:t>
+            </a:r>
+            <a:r>
+              <a:rPr lang="de-DE" dirty="0" err="1"/>
+              <a:t>Machine</a:t>
+            </a:r>
+            <a:endParaRPr lang="de-DE" dirty="0"/>
+          </a:p>
+        </p:txBody>
+      </p:sp>
+      <p:sp>
+        <p:nvSpPr>
+          <p:cNvPr id="5" name="Foliennummernplatzhalter 4">
+            <a:extLst>
+              <a:ext uri="{FF2B5EF4-FFF2-40B4-BE49-F238E27FC236}">
+                <a16:creationId xmlns:a16="http://schemas.microsoft.com/office/drawing/2014/main" id="{84E078B4-BC3A-D577-B282-48724EA128B4}"/>
+              </a:ext>
+            </a:extLst>
+          </p:cNvPr>
+          <p:cNvSpPr>
+            <a:spLocks noGrp="1"/>
+          </p:cNvSpPr>
+          <p:nvPr>
+            <p:ph type="sldNum" sz="quarter" idx="4"/>
+          </p:nvPr>
+        </p:nvSpPr>
+        <p:spPr/>
+        <p:txBody>
+          <a:bodyPr/>
+          <a:lstStyle/>
+          <a:p>
+            <a:pPr>
+              <a:defRPr/>
+            </a:pPr>
+            <a:fld id="{248790C2-FB8D-4AD1-BFB1-8D82BB9A4283}" type="slidenum">
+              <a:rPr lang="de-DE" altLang="de-DE" sz="1000" smtClean="0">
+                <a:solidFill>
+                  <a:srgbClr val="D8413E"/>
+                </a:solidFill>
+                <a:latin typeface="Arial" panose="020B0604020202020204" pitchFamily="34" charset="0"/>
+                <a:cs typeface="Arial" panose="020B0604020202020204" pitchFamily="34" charset="0"/>
+              </a:rPr>
+              <a:pPr>
+                <a:defRPr/>
+              </a:pPr>
+              <a:t>11</a:t>
+            </a:fld>
+            <a:endParaRPr lang="de-DE" altLang="de-DE" sz="1000" dirty="0">
+              <a:solidFill>
+                <a:srgbClr val="D8413E"/>
+              </a:solidFill>
+              <a:latin typeface="Arial" panose="020B0604020202020204" pitchFamily="34" charset="0"/>
+              <a:cs typeface="Arial" panose="020B0604020202020204" pitchFamily="34" charset="0"/>
+            </a:endParaRPr>
+          </a:p>
+        </p:txBody>
+      </p:sp>
+      <p:pic>
+        <p:nvPicPr>
+          <p:cNvPr id="13" name="Grafik 12" descr="Ein Bild, das Text, Screenshot, Schrift, Design enthält.&#10;&#10;Automatisch generierte Beschreibung">
+            <a:extLst>
+              <a:ext uri="{FF2B5EF4-FFF2-40B4-BE49-F238E27FC236}">
+                <a16:creationId xmlns:a16="http://schemas.microsoft.com/office/drawing/2014/main" id="{775077D9-A12B-B603-46D3-9447F7C38422}"/>
+              </a:ext>
+            </a:extLst>
+          </p:cNvPr>
+          <p:cNvPicPr>
+            <a:picLocks noChangeAspect="1"/>
+          </p:cNvPicPr>
+          <p:nvPr/>
+        </p:nvPicPr>
+        <p:blipFill>
+          <a:blip r:embed="rId3"/>
+          <a:stretch>
+            <a:fillRect/>
+          </a:stretch>
+        </p:blipFill>
+        <p:spPr>
+          <a:xfrm>
+            <a:off x="2666367" y="1063624"/>
+            <a:ext cx="3811266" cy="3566582"/>
+          </a:xfrm>
+          <a:prstGeom prst="rect">
+            <a:avLst/>
+          </a:prstGeom>
+        </p:spPr>
+      </p:pic>
+      <p:pic>
+        <p:nvPicPr>
+          <p:cNvPr id="9" name="Grafik 8" descr="Ein Bild, das Text, Screenshot, Schrift enthält.&#10;&#10;Automatisch generierte Beschreibung">
+            <a:extLst>
+              <a:ext uri="{FF2B5EF4-FFF2-40B4-BE49-F238E27FC236}">
+                <a16:creationId xmlns:a16="http://schemas.microsoft.com/office/drawing/2014/main" id="{649A5188-7139-7B55-0CFF-195BAE0FB8A9}"/>
+              </a:ext>
+            </a:extLst>
+          </p:cNvPr>
+          <p:cNvPicPr>
+            <a:picLocks noChangeAspect="1"/>
+          </p:cNvPicPr>
+          <p:nvPr/>
+        </p:nvPicPr>
+        <p:blipFill>
+          <a:blip r:embed="rId4"/>
+          <a:stretch>
+            <a:fillRect/>
+          </a:stretch>
+        </p:blipFill>
+        <p:spPr>
+          <a:xfrm>
+            <a:off x="1901171" y="1516229"/>
+            <a:ext cx="5341658" cy="2111041"/>
+          </a:xfrm>
+          <a:prstGeom prst="rect">
+            <a:avLst/>
+          </a:prstGeom>
+        </p:spPr>
+      </p:pic>
+    </p:spTree>
+    <p:extLst>
+      <p:ext uri="{BB962C8B-B14F-4D97-AF65-F5344CB8AC3E}">
+        <p14:creationId xmlns:p14="http://schemas.microsoft.com/office/powerpoint/2010/main" val="671163917"/>
+      </p:ext>
+    </p:extLst>
+  </p:cSld>
+  <p:clrMapOvr>
+    <a:masterClrMapping/>
+  </p:clrMapOvr>
+  <p:timing>
+    <p:tnLst>
+      <p:par>
+        <p:cTn id="1" dur="indefinite" restart="never" nodeType="tmRoot">
+          <p:childTnLst>
+            <p:seq concurrent="1" nextAc="seek">
+              <p:cTn id="2" dur="indefinite" nodeType="mainSeq">
+                <p:childTnLst>
+                  <p:par>
+                    <p:cTn id="3" fill="hold">
+                      <p:stCondLst>
+                        <p:cond delay="indefinite"/>
+                      </p:stCondLst>
+                      <p:childTnLst>
+                        <p:par>
+                          <p:cTn id="4" fill="hold">
+                            <p:stCondLst>
+                              <p:cond delay="0"/>
+                            </p:stCondLst>
+                            <p:childTnLst>
+                              <p:par>
+                                <p:cTn id="5" presetID="1" presetClass="entr" presetSubtype="0" fill="hold" nodeType="clickEffect">
+                                  <p:stCondLst>
+                                    <p:cond delay="0"/>
+                                  </p:stCondLst>
+                                  <p:childTnLst>
+                                    <p:set>
+                                      <p:cBhvr>
+                                        <p:cTn id="6" dur="1" fill="hold">
+                                          <p:stCondLst>
+                                            <p:cond delay="0"/>
+                                          </p:stCondLst>
+                                        </p:cTn>
+                                        <p:tgtEl>
+                                          <p:spTgt spid="13"/>
+                                        </p:tgtEl>
+                                        <p:attrNameLst>
+                                          <p:attrName>style.visibility</p:attrName>
+                                        </p:attrNameLst>
+                                      </p:cBhvr>
+                                      <p:to>
+                                        <p:strVal val="visible"/>
+                                      </p:to>
+                                    </p:set>
+                                  </p:childTnLst>
+                                </p:cTn>
+                              </p:par>
+                              <p:par>
+                                <p:cTn id="7" presetID="1" presetClass="exit" presetSubtype="0" fill="hold" nodeType="withEffect">
+                                  <p:stCondLst>
+                                    <p:cond delay="0"/>
+                                  </p:stCondLst>
+                                  <p:childTnLst>
+                                    <p:set>
+                                      <p:cBhvr>
+                                        <p:cTn id="8" dur="1" fill="hold">
+                                          <p:stCondLst>
+                                            <p:cond delay="0"/>
+                                          </p:stCondLst>
+                                        </p:cTn>
+                                        <p:tgtEl>
+                                          <p:spTgt spid="11"/>
+                                        </p:tgtEl>
+                                        <p:attrNameLst>
+                                          <p:attrName>style.visibility</p:attrName>
+                                        </p:attrNameLst>
+                                      </p:cBhvr>
+                                      <p:to>
+                                        <p:strVal val="hidden"/>
+                                      </p:to>
+                                    </p:set>
+                                  </p:childTnLst>
+                                </p:cTn>
+                              </p:par>
+                            </p:childTnLst>
+                          </p:cTn>
+                        </p:par>
+                      </p:childTnLst>
+                    </p:cTn>
+                  </p:par>
+                  <p:par>
+                    <p:cTn id="9" fill="hold">
+                      <p:stCondLst>
+                        <p:cond delay="indefinite"/>
+                      </p:stCondLst>
+                      <p:childTnLst>
+                        <p:par>
+                          <p:cTn id="10" fill="hold">
+                            <p:stCondLst>
+                              <p:cond delay="0"/>
+                            </p:stCondLst>
+                            <p:childTnLst>
+                              <p:par>
+                                <p:cTn id="11" presetID="1" presetClass="entr" presetSubtype="0" fill="hold" nodeType="clickEffect">
+                                  <p:stCondLst>
+                                    <p:cond delay="0"/>
+                                  </p:stCondLst>
+                                  <p:childTnLst>
+                                    <p:set>
+                                      <p:cBhvr>
+                                        <p:cTn id="12" dur="1" fill="hold">
+                                          <p:stCondLst>
+                                            <p:cond delay="0"/>
+                                          </p:stCondLst>
+                                        </p:cTn>
+                                        <p:tgtEl>
+                                          <p:spTgt spid="9"/>
+                                        </p:tgtEl>
+                                        <p:attrNameLst>
+                                          <p:attrName>style.visibility</p:attrName>
+                                        </p:attrNameLst>
+                                      </p:cBhvr>
+                                      <p:to>
+                                        <p:strVal val="visible"/>
+                                      </p:to>
+                                    </p:set>
+                                  </p:childTnLst>
+                                </p:cTn>
+                              </p:par>
+                              <p:par>
+                                <p:cTn id="13" presetID="1" presetClass="exit" presetSubtype="0" fill="hold" nodeType="withEffect">
+                                  <p:stCondLst>
+                                    <p:cond delay="0"/>
+                                  </p:stCondLst>
+                                  <p:childTnLst>
+                                    <p:set>
+                                      <p:cBhvr>
+                                        <p:cTn id="14" dur="1" fill="hold">
+                                          <p:stCondLst>
+                                            <p:cond delay="0"/>
+                                          </p:stCondLst>
+                                        </p:cTn>
+                                        <p:tgtEl>
+                                          <p:spTgt spid="13"/>
+                                        </p:tgtEl>
+                                        <p:attrNameLst>
+                                          <p:attrName>style.visibility</p:attrName>
+                                        </p:attrNameLst>
+                                      </p:cBhvr>
+                                      <p:to>
+                                        <p:strVal val="hidden"/>
+                                      </p:to>
+                                    </p:set>
+                                  </p:childTnLst>
+                                </p:cTn>
+                              </p:par>
+                            </p:childTnLst>
+                          </p:cTn>
+                        </p:par>
+                      </p:childTnLst>
+                    </p:cTn>
+                  </p:par>
+                </p:childTnLst>
+              </p:cTn>
+              <p:prevCondLst>
+                <p:cond evt="onPrev" delay="0">
+                  <p:tgtEl>
+                    <p:sldTgt/>
+                  </p:tgtEl>
+                </p:cond>
+              </p:prevCondLst>
+              <p:nextCondLst>
+                <p:cond evt="onNext" delay="0">
+                  <p:tgtEl>
+                    <p:sldTgt/>
+                  </p:tgtEl>
+                </p:cond>
+              </p:nextCondLst>
+            </p:seq>
+          </p:childTnLst>
+        </p:cTn>
+      </p:par>
+    </p:tnLst>
+  </p:timing>
+</p:sld>
+</file>
+
+<file path=ppt/slides/slide12.xml><?xml version="1.0" encoding="utf-8"?>
+<p:sld xmlns:a="http://schemas.openxmlformats.org/drawingml/2006/main" xmlns:r="http://schemas.openxmlformats.org/officeDocument/2006/relationships" xmlns:p="http://schemas.openxmlformats.org/presentationml/2006/main">
+  <p:cSld>
+    <p:spTree>
+      <p:nvGrpSpPr>
+        <p:cNvPr id="1" name=""/>
+        <p:cNvGrpSpPr/>
+        <p:nvPr/>
+      </p:nvGrpSpPr>
+      <p:grpSpPr>
+        <a:xfrm>
+          <a:off x="0" y="0"/>
+          <a:ext cx="0" cy="0"/>
+          <a:chOff x="0" y="0"/>
+          <a:chExt cx="0" cy="0"/>
+        </a:xfrm>
+      </p:grpSpPr>
+      <p:sp>
+        <p:nvSpPr>
+          <p:cNvPr id="6" name="Titel 5">
+            <a:extLst>
+              <a:ext uri="{FF2B5EF4-FFF2-40B4-BE49-F238E27FC236}">
+                <a16:creationId xmlns:a16="http://schemas.microsoft.com/office/drawing/2014/main" id="{A09E4575-A489-536F-697F-D7D40F38035B}"/>
+              </a:ext>
+            </a:extLst>
+          </p:cNvPr>
+          <p:cNvSpPr>
+            <a:spLocks noGrp="1"/>
+          </p:cNvSpPr>
+          <p:nvPr>
+            <p:ph type="title"/>
+          </p:nvPr>
+        </p:nvSpPr>
+        <p:spPr/>
+        <p:txBody>
+          <a:bodyPr/>
+          <a:lstStyle/>
+          <a:p>
+            <a:r>
+              <a:rPr lang="de-DE" dirty="0" err="1"/>
+              <a:t>Teachable</a:t>
+            </a:r>
+            <a:r>
+              <a:rPr lang="de-DE" dirty="0"/>
+              <a:t> </a:t>
+            </a:r>
+            <a:r>
+              <a:rPr lang="de-DE" dirty="0" err="1"/>
+              <a:t>Machine</a:t>
+            </a:r>
+            <a:endParaRPr lang="de-DE" dirty="0"/>
+          </a:p>
+        </p:txBody>
+      </p:sp>
+      <p:sp>
+        <p:nvSpPr>
+          <p:cNvPr id="7" name="Inhaltsplatzhalter 6">
+            <a:extLst>
+              <a:ext uri="{FF2B5EF4-FFF2-40B4-BE49-F238E27FC236}">
+                <a16:creationId xmlns:a16="http://schemas.microsoft.com/office/drawing/2014/main" id="{12C58871-78D9-7E8C-89FC-D2FA2F52A46D}"/>
+              </a:ext>
+            </a:extLst>
+          </p:cNvPr>
+          <p:cNvSpPr>
+            <a:spLocks noGrp="1"/>
+          </p:cNvSpPr>
+          <p:nvPr>
+            <p:ph idx="1"/>
+          </p:nvPr>
+        </p:nvSpPr>
+        <p:spPr/>
+        <p:txBody>
+          <a:bodyPr/>
+          <a:lstStyle/>
+          <a:p>
+            <a:r>
+              <a:rPr lang="de-DE" dirty="0"/>
+              <a:t>Beispiel Hund – Katze zeigen</a:t>
+            </a:r>
+          </a:p>
+          <a:p>
+            <a:pPr marL="0" indent="0">
+              <a:buNone/>
+            </a:pPr>
+            <a:endParaRPr lang="de-DE" dirty="0"/>
+          </a:p>
+          <a:p>
+            <a:pPr marL="0" indent="0">
+              <a:buNone/>
+            </a:pPr>
+            <a:r>
+              <a:rPr lang="de-DE" dirty="0">
+                <a:hlinkClick r:id="rId2"/>
+              </a:rPr>
+              <a:t>teachablemachine.withgoogle.com</a:t>
+            </a:r>
+            <a:endParaRPr lang="de-DE" dirty="0"/>
+          </a:p>
+        </p:txBody>
+      </p:sp>
+      <p:sp>
+        <p:nvSpPr>
+          <p:cNvPr id="5" name="Foliennummernplatzhalter 4">
+            <a:extLst>
+              <a:ext uri="{FF2B5EF4-FFF2-40B4-BE49-F238E27FC236}">
+                <a16:creationId xmlns:a16="http://schemas.microsoft.com/office/drawing/2014/main" id="{57D21B1A-E12C-E989-EC09-609E04FC294C}"/>
+              </a:ext>
+            </a:extLst>
+          </p:cNvPr>
+          <p:cNvSpPr>
+            <a:spLocks noGrp="1"/>
+          </p:cNvSpPr>
+          <p:nvPr>
+            <p:ph type="sldNum" sz="quarter" idx="4"/>
+          </p:nvPr>
+        </p:nvSpPr>
+        <p:spPr/>
+        <p:txBody>
+          <a:bodyPr/>
+          <a:lstStyle/>
+          <a:p>
+            <a:pPr>
+              <a:defRPr/>
+            </a:pPr>
+            <a:fld id="{248790C2-FB8D-4AD1-BFB1-8D82BB9A4283}" type="slidenum">
+              <a:rPr lang="de-DE" altLang="de-DE" sz="1000" smtClean="0">
+                <a:solidFill>
+                  <a:srgbClr val="D8413E"/>
+                </a:solidFill>
+                <a:latin typeface="Arial" panose="020B0604020202020204" pitchFamily="34" charset="0"/>
+                <a:cs typeface="Arial" panose="020B0604020202020204" pitchFamily="34" charset="0"/>
+              </a:rPr>
+              <a:pPr>
+                <a:defRPr/>
+              </a:pPr>
+              <a:t>12</a:t>
+            </a:fld>
+            <a:endParaRPr lang="de-DE" altLang="de-DE" sz="1000" dirty="0">
+              <a:solidFill>
+                <a:srgbClr val="D8413E"/>
+              </a:solidFill>
+              <a:latin typeface="Arial" panose="020B0604020202020204" pitchFamily="34" charset="0"/>
+              <a:cs typeface="Arial" panose="020B0604020202020204" pitchFamily="34" charset="0"/>
+            </a:endParaRPr>
+          </a:p>
+        </p:txBody>
+      </p:sp>
+    </p:spTree>
+    <p:extLst>
+      <p:ext uri="{BB962C8B-B14F-4D97-AF65-F5344CB8AC3E}">
+        <p14:creationId xmlns:p14="http://schemas.microsoft.com/office/powerpoint/2010/main" val="3530594865"/>
+      </p:ext>
+    </p:extLst>
+  </p:cSld>
+  <p:clrMapOvr>
+    <a:masterClrMapping/>
+  </p:clrMapOvr>
+</p:sld>
+</file>
+
+<file path=ppt/slides/slide13.xml><?xml version="1.0" encoding="utf-8"?>
+<p:sld xmlns:a="http://schemas.openxmlformats.org/drawingml/2006/main" xmlns:r="http://schemas.openxmlformats.org/officeDocument/2006/relationships" xmlns:p="http://schemas.openxmlformats.org/presentationml/2006/main">
+  <p:cSld>
+    <p:spTree>
+      <p:nvGrpSpPr>
+        <p:cNvPr id="1" name=""/>
+        <p:cNvGrpSpPr/>
+        <p:nvPr/>
+      </p:nvGrpSpPr>
+      <p:grpSpPr>
+        <a:xfrm>
+          <a:off x="0" y="0"/>
+          <a:ext cx="0" cy="0"/>
+          <a:chOff x="0" y="0"/>
+          <a:chExt cx="0" cy="0"/>
+        </a:xfrm>
+      </p:grpSpPr>
+      <p:sp>
+        <p:nvSpPr>
+          <p:cNvPr id="6" name="Titel 5">
+            <a:extLst>
+              <a:ext uri="{FF2B5EF4-FFF2-40B4-BE49-F238E27FC236}">
+                <a16:creationId xmlns:a16="http://schemas.microsoft.com/office/drawing/2014/main" id="{A6A70BC8-7AD3-AB14-11CC-228FF19A1656}"/>
+              </a:ext>
+            </a:extLst>
+          </p:cNvPr>
+          <p:cNvSpPr>
+            <a:spLocks noGrp="1"/>
+          </p:cNvSpPr>
+          <p:nvPr>
+            <p:ph type="title"/>
+          </p:nvPr>
+        </p:nvSpPr>
+        <p:spPr/>
+        <p:txBody>
+          <a:bodyPr/>
+          <a:lstStyle/>
+          <a:p>
+            <a:r>
+              <a:rPr lang="de-DE" dirty="0"/>
+              <a:t>Erprobung</a:t>
+            </a:r>
+          </a:p>
+        </p:txBody>
+      </p:sp>
+      <p:sp>
+        <p:nvSpPr>
+          <p:cNvPr id="7" name="Inhaltsplatzhalter 6">
+            <a:extLst>
+              <a:ext uri="{FF2B5EF4-FFF2-40B4-BE49-F238E27FC236}">
+                <a16:creationId xmlns:a16="http://schemas.microsoft.com/office/drawing/2014/main" id="{0A3BC093-175F-A405-A0A9-5B64BD7106B1}"/>
+              </a:ext>
+            </a:extLst>
+          </p:cNvPr>
+          <p:cNvSpPr>
+            <a:spLocks noGrp="1"/>
+          </p:cNvSpPr>
+          <p:nvPr>
+            <p:ph idx="1"/>
+          </p:nvPr>
+        </p:nvSpPr>
+        <p:spPr/>
+        <p:txBody>
+          <a:bodyPr/>
+          <a:lstStyle/>
+          <a:p>
+            <a:r>
+              <a:rPr lang="de-DE" dirty="0"/>
+              <a:t>Erprobung mit 7. Klässlern im Rahmen einer AG an der EAH-Jena</a:t>
+            </a:r>
+          </a:p>
+          <a:p>
+            <a:r>
+              <a:rPr lang="de-DE" dirty="0"/>
+              <a:t>Erprobung mit 9. Klässlern im regulären Informatikunterricht an der Max-Klinger-Schule Leipzig</a:t>
+            </a:r>
+          </a:p>
+          <a:p>
+            <a:endParaRPr lang="de-DE" dirty="0"/>
+          </a:p>
+        </p:txBody>
+      </p:sp>
+      <p:sp>
+        <p:nvSpPr>
+          <p:cNvPr id="5" name="Foliennummernplatzhalter 4">
+            <a:extLst>
+              <a:ext uri="{FF2B5EF4-FFF2-40B4-BE49-F238E27FC236}">
+                <a16:creationId xmlns:a16="http://schemas.microsoft.com/office/drawing/2014/main" id="{EF5CB133-C741-7030-914C-08B3A00874E1}"/>
+              </a:ext>
+            </a:extLst>
+          </p:cNvPr>
+          <p:cNvSpPr>
+            <a:spLocks noGrp="1"/>
+          </p:cNvSpPr>
+          <p:nvPr>
+            <p:ph type="sldNum" sz="quarter" idx="4"/>
+          </p:nvPr>
+        </p:nvSpPr>
+        <p:spPr/>
+        <p:txBody>
+          <a:bodyPr/>
+          <a:lstStyle/>
+          <a:p>
+            <a:pPr>
+              <a:defRPr/>
+            </a:pPr>
+            <a:fld id="{248790C2-FB8D-4AD1-BFB1-8D82BB9A4283}" type="slidenum">
+              <a:rPr lang="de-DE" altLang="de-DE" sz="1000" smtClean="0">
+                <a:solidFill>
+                  <a:srgbClr val="D8413E"/>
+                </a:solidFill>
+                <a:latin typeface="Arial" panose="020B0604020202020204" pitchFamily="34" charset="0"/>
+                <a:cs typeface="Arial" panose="020B0604020202020204" pitchFamily="34" charset="0"/>
+              </a:rPr>
+              <a:pPr>
+                <a:defRPr/>
+              </a:pPr>
+              <a:t>13</a:t>
+            </a:fld>
+            <a:endParaRPr lang="de-DE" altLang="de-DE" sz="1000" dirty="0">
+              <a:solidFill>
+                <a:srgbClr val="D8413E"/>
+              </a:solidFill>
+              <a:latin typeface="Arial" panose="020B0604020202020204" pitchFamily="34" charset="0"/>
+              <a:cs typeface="Arial" panose="020B0604020202020204" pitchFamily="34" charset="0"/>
+            </a:endParaRPr>
+          </a:p>
+        </p:txBody>
+      </p:sp>
+    </p:spTree>
+    <p:extLst>
+      <p:ext uri="{BB962C8B-B14F-4D97-AF65-F5344CB8AC3E}">
+        <p14:creationId xmlns:p14="http://schemas.microsoft.com/office/powerpoint/2010/main" val="3987969237"/>
+      </p:ext>
+    </p:extLst>
+  </p:cSld>
+  <p:clrMapOvr>
+    <a:masterClrMapping/>
+  </p:clrMapOvr>
+</p:sld>
+</file>
+
+<file path=ppt/slides/slide14.xml><?xml version="1.0" encoding="utf-8"?>
+<p:sld xmlns:a="http://schemas.openxmlformats.org/drawingml/2006/main" xmlns:r="http://schemas.openxmlformats.org/officeDocument/2006/relationships" xmlns:p="http://schemas.openxmlformats.org/presentationml/2006/main">
+  <p:cSld>
+    <p:spTree>
+      <p:nvGrpSpPr>
+        <p:cNvPr id="1" name=""/>
+        <p:cNvGrpSpPr/>
+        <p:nvPr/>
+      </p:nvGrpSpPr>
+      <p:grpSpPr>
+        <a:xfrm>
+          <a:off x="0" y="0"/>
+          <a:ext cx="0" cy="0"/>
+          <a:chOff x="0" y="0"/>
+          <a:chExt cx="0" cy="0"/>
+        </a:xfrm>
+      </p:grpSpPr>
+      <p:sp>
+        <p:nvSpPr>
+          <p:cNvPr id="6" name="Titel 5">
+            <a:extLst>
+              <a:ext uri="{FF2B5EF4-FFF2-40B4-BE49-F238E27FC236}">
+                <a16:creationId xmlns:a16="http://schemas.microsoft.com/office/drawing/2014/main" id="{00D34ACA-B041-9660-B253-E228747BA63D}"/>
+              </a:ext>
+            </a:extLst>
+          </p:cNvPr>
+          <p:cNvSpPr>
+            <a:spLocks noGrp="1"/>
+          </p:cNvSpPr>
+          <p:nvPr>
+            <p:ph type="title"/>
+          </p:nvPr>
+        </p:nvSpPr>
+        <p:spPr/>
+        <p:txBody>
+          <a:bodyPr/>
+          <a:lstStyle/>
+          <a:p>
+            <a:r>
+              <a:rPr lang="de-DE" dirty="0"/>
+              <a:t>Zusammenfassung</a:t>
+            </a:r>
+          </a:p>
+        </p:txBody>
+      </p:sp>
+      <p:sp>
+        <p:nvSpPr>
+          <p:cNvPr id="7" name="Inhaltsplatzhalter 6">
+            <a:extLst>
+              <a:ext uri="{FF2B5EF4-FFF2-40B4-BE49-F238E27FC236}">
+                <a16:creationId xmlns:a16="http://schemas.microsoft.com/office/drawing/2014/main" id="{220E78AA-5184-6EA7-D9E1-50DE1B61196A}"/>
+              </a:ext>
+            </a:extLst>
+          </p:cNvPr>
+          <p:cNvSpPr>
+            <a:spLocks noGrp="1"/>
+          </p:cNvSpPr>
+          <p:nvPr>
+            <p:ph idx="1"/>
+          </p:nvPr>
+        </p:nvSpPr>
+        <p:spPr/>
+        <p:txBody>
+          <a:bodyPr/>
+          <a:lstStyle/>
+          <a:p>
+            <a:r>
+              <a:rPr lang="de-DE" dirty="0"/>
+              <a:t>Thema relevant und wichtig für die Zukunft der SuS</a:t>
+            </a:r>
+          </a:p>
+          <a:p>
+            <a:r>
+              <a:rPr lang="de-DE" dirty="0"/>
+              <a:t>Möglichkeit zur Verbesserung der Lernprozesses</a:t>
+            </a:r>
+          </a:p>
+          <a:p>
+            <a:endParaRPr lang="de-DE" dirty="0"/>
+          </a:p>
+        </p:txBody>
+      </p:sp>
+      <p:sp>
+        <p:nvSpPr>
+          <p:cNvPr id="5" name="Foliennummernplatzhalter 4">
+            <a:extLst>
+              <a:ext uri="{FF2B5EF4-FFF2-40B4-BE49-F238E27FC236}">
+                <a16:creationId xmlns:a16="http://schemas.microsoft.com/office/drawing/2014/main" id="{B8174E8E-8A1B-8791-0FBA-F33AAD7C9BBF}"/>
+              </a:ext>
+            </a:extLst>
+          </p:cNvPr>
+          <p:cNvSpPr>
+            <a:spLocks noGrp="1"/>
+          </p:cNvSpPr>
+          <p:nvPr>
+            <p:ph type="sldNum" sz="quarter" idx="4"/>
+          </p:nvPr>
+        </p:nvSpPr>
+        <p:spPr/>
+        <p:txBody>
+          <a:bodyPr/>
+          <a:lstStyle/>
+          <a:p>
+            <a:pPr>
+              <a:defRPr/>
+            </a:pPr>
+            <a:fld id="{248790C2-FB8D-4AD1-BFB1-8D82BB9A4283}" type="slidenum">
+              <a:rPr lang="de-DE" altLang="de-DE" sz="1000" smtClean="0">
+                <a:solidFill>
+                  <a:srgbClr val="D8413E"/>
+                </a:solidFill>
+                <a:latin typeface="Arial" panose="020B0604020202020204" pitchFamily="34" charset="0"/>
+                <a:cs typeface="Arial" panose="020B0604020202020204" pitchFamily="34" charset="0"/>
+              </a:rPr>
+              <a:pPr>
+                <a:defRPr/>
+              </a:pPr>
+              <a:t>14</a:t>
+            </a:fld>
+            <a:endParaRPr lang="de-DE" altLang="de-DE" sz="1000" dirty="0">
+              <a:solidFill>
+                <a:srgbClr val="D8413E"/>
+              </a:solidFill>
+              <a:latin typeface="Arial" panose="020B0604020202020204" pitchFamily="34" charset="0"/>
+              <a:cs typeface="Arial" panose="020B0604020202020204" pitchFamily="34" charset="0"/>
+            </a:endParaRPr>
+          </a:p>
+        </p:txBody>
+      </p:sp>
+    </p:spTree>
+    <p:extLst>
+      <p:ext uri="{BB962C8B-B14F-4D97-AF65-F5344CB8AC3E}">
+        <p14:creationId xmlns:p14="http://schemas.microsoft.com/office/powerpoint/2010/main" val="4256430367"/>
+      </p:ext>
+    </p:extLst>
+  </p:cSld>
+  <p:clrMapOvr>
+    <a:masterClrMapping/>
+  </p:clrMapOvr>
+</p:sld>
+</file>
+
 <file path=ppt/slides/slide2.xml><?xml version="1.0" encoding="utf-8"?>
 <p:sld xmlns:a="http://schemas.openxmlformats.org/drawingml/2006/main" xmlns:r="http://schemas.openxmlformats.org/officeDocument/2006/relationships" xmlns:p="http://schemas.openxmlformats.org/presentationml/2006/main">
   <p:cSld>
@@ -5044,6 +6124,13 @@
           <a:p>
             <a:r>
               <a:rPr lang="en-US" dirty="0" err="1"/>
+              <a:t>Ontologie</a:t>
+            </a:r>
+            <a:endParaRPr lang="en-US" dirty="0"/>
+          </a:p>
+          <a:p>
+            <a:r>
+              <a:rPr lang="en-US" dirty="0" err="1"/>
               <a:t>Moodlekurs</a:t>
             </a:r>
             <a:r>
@@ -5062,19 +6149,11 @@
           <a:p>
             <a:r>
               <a:rPr lang="en-US" dirty="0" err="1"/>
-              <a:t>Methodik</a:t>
+              <a:t>Lehrplanbezug</a:t>
             </a:r>
             <a:endParaRPr lang="en-US" dirty="0"/>
           </a:p>
           <a:p>
-            <a:r>
-              <a:rPr lang="en-US" dirty="0" err="1"/>
-              <a:t>Lern</a:t>
-            </a:r>
-            <a:r>
-              <a:rPr lang="en-US" dirty="0"/>
-              <a:t>- und </a:t>
-            </a:r>
             <a:r>
               <a:rPr lang="en-US" dirty="0" err="1"/>
               <a:t>Kompetenz-Ziele</a:t>
@@ -5084,14 +6163,27 @@
           <a:p>
             <a:r>
               <a:rPr lang="en-US" dirty="0"/>
-              <a:t>Results</a:t>
-            </a:r>
-          </a:p>
-          <a:p>
-            <a:r>
-              <a:rPr lang="en-US" dirty="0"/>
-              <a:t>Conclusion</a:t>
-            </a:r>
+              <a:t>Workflow der </a:t>
+            </a:r>
+            <a:r>
+              <a:rPr lang="en-US" dirty="0" err="1"/>
+              <a:t>SuS</a:t>
+            </a:r>
+            <a:endParaRPr lang="en-US" dirty="0"/>
+          </a:p>
+          <a:p>
+            <a:r>
+              <a:rPr lang="en-US" dirty="0" err="1"/>
+              <a:t>Erprobung</a:t>
+            </a:r>
+            <a:endParaRPr lang="en-US" dirty="0"/>
+          </a:p>
+          <a:p>
+            <a:r>
+              <a:rPr lang="en-US" dirty="0" err="1"/>
+              <a:t>Zusammenfassung</a:t>
+            </a:r>
+            <a:endParaRPr lang="en-US" dirty="0"/>
           </a:p>
           <a:p>
             <a:endParaRPr lang="de-DE" dirty="0"/>
@@ -5183,10 +6275,16 @@
             </a:r>
           </a:p>
           <a:p>
-            <a:r>
-              <a:rPr lang="de-DE" dirty="0"/>
-              <a:t>Demographie der Lehrkräfte sehr alt</a:t>
-            </a:r>
+            <a:endParaRPr lang="de-DE" dirty="0"/>
+          </a:p>
+          <a:p>
+            <a:endParaRPr lang="de-DE" dirty="0"/>
+          </a:p>
+          <a:p>
+            <a:endParaRPr lang="de-DE" dirty="0"/>
+          </a:p>
+          <a:p>
+            <a:endParaRPr lang="de-DE" dirty="0"/>
           </a:p>
           <a:p>
             <a:r>
@@ -5197,19 +6295,21 @@
           <a:p>
             <a:r>
               <a:rPr lang="de-DE" dirty="0"/>
-              <a:t>KI zukunftsrelevant</a:t>
-            </a:r>
-          </a:p>
-          <a:p>
+              <a:t>KI zukunftsrelevant für SuS</a:t>
+            </a:r>
+          </a:p>
+          <a:p>
+            <a:pPr lvl="1"/>
             <a:r>
               <a:rPr lang="de-DE" dirty="0"/>
               <a:t>Wichtig für SuS den Umgang mit KI zu erlernen</a:t>
             </a:r>
           </a:p>
           <a:p>
+            <a:pPr lvl="1"/>
             <a:r>
               <a:rPr lang="de-DE" dirty="0"/>
-              <a:t>Auch erklären, wie eine KI erstellt und trainiert wird</a:t>
+              <a:t>Wie wird eine KI erstellt und trainier?</a:t>
             </a:r>
           </a:p>
           <a:p>
@@ -5274,6 +6374,196 @@
   <p:clrMapOvr>
     <a:masterClrMapping/>
   </p:clrMapOvr>
+  <p:timing>
+    <p:tnLst>
+      <p:par>
+        <p:cTn id="1" dur="indefinite" restart="never" nodeType="tmRoot">
+          <p:childTnLst>
+            <p:seq concurrent="1" nextAc="seek">
+              <p:cTn id="2" dur="indefinite" nodeType="mainSeq">
+                <p:childTnLst>
+                  <p:par>
+                    <p:cTn id="3" fill="hold">
+                      <p:stCondLst>
+                        <p:cond delay="indefinite"/>
+                      </p:stCondLst>
+                      <p:childTnLst>
+                        <p:par>
+                          <p:cTn id="4" fill="hold">
+                            <p:stCondLst>
+                              <p:cond delay="0"/>
+                            </p:stCondLst>
+                            <p:childTnLst>
+                              <p:par>
+                                <p:cTn id="5" presetID="1" presetClass="entr" presetSubtype="0" fill="hold" nodeType="clickEffect">
+                                  <p:stCondLst>
+                                    <p:cond delay="0"/>
+                                  </p:stCondLst>
+                                  <p:childTnLst>
+                                    <p:set>
+                                      <p:cBhvr>
+                                        <p:cTn id="6" dur="1" fill="hold">
+                                          <p:stCondLst>
+                                            <p:cond delay="0"/>
+                                          </p:stCondLst>
+                                        </p:cTn>
+                                        <p:tgtEl>
+                                          <p:spTgt spid="7">
+                                            <p:txEl>
+                                              <p:pRg st="5" end="5"/>
+                                            </p:txEl>
+                                          </p:spTgt>
+                                        </p:tgtEl>
+                                        <p:attrNameLst>
+                                          <p:attrName>style.visibility</p:attrName>
+                                        </p:attrNameLst>
+                                      </p:cBhvr>
+                                      <p:to>
+                                        <p:strVal val="visible"/>
+                                      </p:to>
+                                    </p:set>
+                                  </p:childTnLst>
+                                </p:cTn>
+                              </p:par>
+                            </p:childTnLst>
+                          </p:cTn>
+                        </p:par>
+                      </p:childTnLst>
+                    </p:cTn>
+                  </p:par>
+                  <p:par>
+                    <p:cTn id="7" fill="hold">
+                      <p:stCondLst>
+                        <p:cond delay="indefinite"/>
+                      </p:stCondLst>
+                      <p:childTnLst>
+                        <p:par>
+                          <p:cTn id="8" fill="hold">
+                            <p:stCondLst>
+                              <p:cond delay="0"/>
+                            </p:stCondLst>
+                            <p:childTnLst>
+                              <p:par>
+                                <p:cTn id="9" presetID="1" presetClass="entr" presetSubtype="0" fill="hold" nodeType="clickEffect">
+                                  <p:stCondLst>
+                                    <p:cond delay="0"/>
+                                  </p:stCondLst>
+                                  <p:childTnLst>
+                                    <p:set>
+                                      <p:cBhvr>
+                                        <p:cTn id="10" dur="1" fill="hold">
+                                          <p:stCondLst>
+                                            <p:cond delay="0"/>
+                                          </p:stCondLst>
+                                        </p:cTn>
+                                        <p:tgtEl>
+                                          <p:spTgt spid="7">
+                                            <p:txEl>
+                                              <p:pRg st="6" end="6"/>
+                                            </p:txEl>
+                                          </p:spTgt>
+                                        </p:tgtEl>
+                                        <p:attrNameLst>
+                                          <p:attrName>style.visibility</p:attrName>
+                                        </p:attrNameLst>
+                                      </p:cBhvr>
+                                      <p:to>
+                                        <p:strVal val="visible"/>
+                                      </p:to>
+                                    </p:set>
+                                  </p:childTnLst>
+                                </p:cTn>
+                              </p:par>
+                              <p:par>
+                                <p:cTn id="11" presetID="1" presetClass="entr" presetSubtype="0" fill="hold" nodeType="withEffect">
+                                  <p:stCondLst>
+                                    <p:cond delay="0"/>
+                                  </p:stCondLst>
+                                  <p:childTnLst>
+                                    <p:set>
+                                      <p:cBhvr>
+                                        <p:cTn id="12" dur="1" fill="hold">
+                                          <p:stCondLst>
+                                            <p:cond delay="0"/>
+                                          </p:stCondLst>
+                                        </p:cTn>
+                                        <p:tgtEl>
+                                          <p:spTgt spid="7">
+                                            <p:txEl>
+                                              <p:pRg st="7" end="7"/>
+                                            </p:txEl>
+                                          </p:spTgt>
+                                        </p:tgtEl>
+                                        <p:attrNameLst>
+                                          <p:attrName>style.visibility</p:attrName>
+                                        </p:attrNameLst>
+                                      </p:cBhvr>
+                                      <p:to>
+                                        <p:strVal val="visible"/>
+                                      </p:to>
+                                    </p:set>
+                                  </p:childTnLst>
+                                </p:cTn>
+                              </p:par>
+                              <p:par>
+                                <p:cTn id="13" presetID="1" presetClass="entr" presetSubtype="0" fill="hold" nodeType="withEffect">
+                                  <p:stCondLst>
+                                    <p:cond delay="0"/>
+                                  </p:stCondLst>
+                                  <p:childTnLst>
+                                    <p:set>
+                                      <p:cBhvr>
+                                        <p:cTn id="14" dur="1" fill="hold">
+                                          <p:stCondLst>
+                                            <p:cond delay="0"/>
+                                          </p:stCondLst>
+                                        </p:cTn>
+                                        <p:tgtEl>
+                                          <p:spTgt spid="7">
+                                            <p:txEl>
+                                              <p:pRg st="8" end="8"/>
+                                            </p:txEl>
+                                          </p:spTgt>
+                                        </p:tgtEl>
+                                        <p:attrNameLst>
+                                          <p:attrName>style.visibility</p:attrName>
+                                        </p:attrNameLst>
+                                      </p:cBhvr>
+                                      <p:to>
+                                        <p:strVal val="visible"/>
+                                      </p:to>
+                                    </p:set>
+                                  </p:childTnLst>
+                                </p:cTn>
+                              </p:par>
+                            </p:childTnLst>
+                          </p:cTn>
+                        </p:par>
+                      </p:childTnLst>
+                    </p:cTn>
+                  </p:par>
+                </p:childTnLst>
+              </p:cTn>
+              <p:prevCondLst>
+                <p:cond evt="onPrev" delay="0">
+                  <p:tgtEl>
+                    <p:sldTgt/>
+                  </p:tgtEl>
+                </p:cond>
+              </p:prevCondLst>
+              <p:nextCondLst>
+                <p:cond evt="onNext" delay="0">
+                  <p:tgtEl>
+                    <p:sldTgt/>
+                  </p:tgtEl>
+                </p:cond>
+              </p:nextCondLst>
+            </p:seq>
+          </p:childTnLst>
+        </p:cTn>
+      </p:par>
+    </p:tnLst>
+  </p:timing>
 </p:sld>
 </file>
 
@@ -5294,110 +6584,372 @@
           <a:chExt cx="0" cy="0"/>
         </a:xfrm>
       </p:grpSpPr>
-      <p:sp>
-        <p:nvSpPr>
-          <p:cNvPr id="6" name="Titel 5">
+      <p:pic>
+        <p:nvPicPr>
+          <p:cNvPr id="10" name="Grafik 9" descr="Ein Bild, das Text, Screenshot, Schrift, Zahl enthält.&#10;&#10;Automatisch generierte Beschreibung">
             <a:extLst>
               <a:ext uri="{FF2B5EF4-FFF2-40B4-BE49-F238E27FC236}">
-                <a16:creationId xmlns:a16="http://schemas.microsoft.com/office/drawing/2014/main" id="{94F688C9-B9CB-1F37-C4A8-ACFCA6D9E146}"/>
+                <a16:creationId xmlns:a16="http://schemas.microsoft.com/office/drawing/2014/main" id="{CD83FDB4-DCE4-A8D4-EBED-400B180FE6A8}"/>
               </a:ext>
             </a:extLst>
           </p:cNvPr>
-          <p:cNvSpPr>
-            <a:spLocks noGrp="1"/>
-          </p:cNvSpPr>
-          <p:nvPr>
-            <p:ph type="title"/>
-          </p:nvPr>
-        </p:nvSpPr>
-        <p:spPr/>
-        <p:txBody>
-          <a:bodyPr/>
-          <a:lstStyle/>
-          <a:p>
-            <a:r>
-              <a:rPr lang="de-DE" dirty="0"/>
-              <a:t>Vorstellung Moodlekurs</a:t>
-            </a:r>
-          </a:p>
-        </p:txBody>
-      </p:sp>
-      <p:sp>
-        <p:nvSpPr>
-          <p:cNvPr id="7" name="Inhaltsplatzhalter 6">
+          <p:cNvPicPr>
+            <a:picLocks noChangeAspect="1"/>
+          </p:cNvPicPr>
+          <p:nvPr/>
+        </p:nvPicPr>
+        <p:blipFill>
+          <a:blip r:embed="rId2"/>
+          <a:stretch>
+            <a:fillRect/>
+          </a:stretch>
+        </p:blipFill>
+        <p:spPr>
+          <a:xfrm>
+            <a:off x="1547973" y="241887"/>
+            <a:ext cx="6048054" cy="4901613"/>
+          </a:xfrm>
+          <a:prstGeom prst="rect">
+            <a:avLst/>
+          </a:prstGeom>
+        </p:spPr>
+      </p:pic>
+      <p:pic>
+        <p:nvPicPr>
+          <p:cNvPr id="8" name="Grafik 7">
             <a:extLst>
               <a:ext uri="{FF2B5EF4-FFF2-40B4-BE49-F238E27FC236}">
-                <a16:creationId xmlns:a16="http://schemas.microsoft.com/office/drawing/2014/main" id="{D0A044D7-92ED-9C7B-3766-7C3DD9B0B1B9}"/>
+                <a16:creationId xmlns:a16="http://schemas.microsoft.com/office/drawing/2014/main" id="{B331A16E-AB4F-8A52-4BFE-13F1205D084E}"/>
               </a:ext>
             </a:extLst>
           </p:cNvPr>
-          <p:cNvSpPr>
-            <a:spLocks noGrp="1"/>
-          </p:cNvSpPr>
-          <p:nvPr>
-            <p:ph idx="1"/>
-          </p:nvPr>
-        </p:nvSpPr>
-        <p:spPr/>
-        <p:txBody>
-          <a:bodyPr/>
-          <a:lstStyle/>
-          <a:p>
-            <a:endParaRPr lang="de-DE"/>
-          </a:p>
-        </p:txBody>
-      </p:sp>
-      <p:sp>
-        <p:nvSpPr>
-          <p:cNvPr id="5" name="Foliennummernplatzhalter 4">
+          <p:cNvPicPr>
+            <a:picLocks noChangeAspect="1"/>
+          </p:cNvPicPr>
+          <p:nvPr/>
+        </p:nvPicPr>
+        <p:blipFill>
+          <a:blip r:embed="rId3"/>
+          <a:stretch>
+            <a:fillRect/>
+          </a:stretch>
+        </p:blipFill>
+        <p:spPr>
+          <a:xfrm>
+            <a:off x="5648468" y="259331"/>
+            <a:ext cx="952381" cy="285714"/>
+          </a:xfrm>
+          <a:prstGeom prst="rect">
+            <a:avLst/>
+          </a:prstGeom>
+        </p:spPr>
+      </p:pic>
+      <mc:AlternateContent xmlns:mc="http://schemas.openxmlformats.org/markup-compatibility/2006" xmlns:pslz="http://schemas.microsoft.com/office/powerpoint/2016/slidezoom">
+        <mc:Choice Requires="pslz">
+          <p:graphicFrame>
+            <p:nvGraphicFramePr>
+              <p:cNvPr id="3" name="Folienzoom 2">
+                <a:extLst>
+                  <a:ext uri="{FF2B5EF4-FFF2-40B4-BE49-F238E27FC236}">
+                    <a16:creationId xmlns:a16="http://schemas.microsoft.com/office/drawing/2014/main" id="{D3B83CD3-86F0-628D-02E5-36A4A7B62111}"/>
+                  </a:ext>
+                </a:extLst>
+              </p:cNvPr>
+              <p:cNvGraphicFramePr>
+                <a:graphicFrameLocks noChangeAspect="1"/>
+              </p:cNvGraphicFramePr>
+              <p:nvPr>
+                <p:extLst>
+                  <p:ext uri="{D42A27DB-BD31-4B8C-83A1-F6EECF244321}">
+                    <p14:modId xmlns:p14="http://schemas.microsoft.com/office/powerpoint/2010/main" val="1971215854"/>
+                  </p:ext>
+                </p:extLst>
+              </p:nvPr>
+            </p:nvGraphicFramePr>
+            <p:xfrm>
+              <a:off x="3679001" y="1724722"/>
+              <a:ext cx="373566" cy="395542"/>
+            </p:xfrm>
+            <a:graphic>
+              <a:graphicData uri="http://schemas.microsoft.com/office/powerpoint/2016/slidezoom">
+                <pslz:sldZm>
+                  <pslz:sldZmObj sldId="298" cId="192380210">
+                    <pslz:zmPr id="{493531CB-A825-402B-8EAD-8C71E783A82C}" imageType="cover" transitionDur="1000">
+                      <p166:blipFill xmlns:p166="http://schemas.microsoft.com/office/powerpoint/2016/6/main">
+                        <a:blip r:embed="rId4"/>
+                        <a:stretch>
+                          <a:fillRect/>
+                        </a:stretch>
+                      </p166:blipFill>
+                      <p166:spPr xmlns:p166="http://schemas.microsoft.com/office/powerpoint/2016/6/main">
+                        <a:xfrm>
+                          <a:off x="0" y="0"/>
+                          <a:ext cx="373566" cy="395542"/>
+                        </a:xfrm>
+                        <a:prstGeom prst="rect">
+                          <a:avLst/>
+                        </a:prstGeom>
+                        <a:noFill/>
+                        <a:ln w="3175">
+                          <a:noFill/>
+                        </a:ln>
+                      </p166:spPr>
+                    </pslz:zmPr>
+                  </pslz:sldZmObj>
+                </pslz:sldZm>
+              </a:graphicData>
+            </a:graphic>
+          </p:graphicFrame>
+        </mc:Choice>
+        <mc:Fallback xmlns="">
+          <p:pic>
+            <p:nvPicPr>
+              <p:cNvPr id="3" name="Folienzoom 2">
+                <a:hlinkClick r:id="rId5" action="ppaction://hlinksldjump"/>
+                <a:extLst>
+                  <a:ext uri="{FF2B5EF4-FFF2-40B4-BE49-F238E27FC236}">
+                    <a16:creationId xmlns:a16="http://schemas.microsoft.com/office/drawing/2014/main" id="{D3B83CD3-86F0-628D-02E5-36A4A7B62111}"/>
+                  </a:ext>
+                </a:extLst>
+              </p:cNvPr>
+              <p:cNvPicPr>
+                <a:picLocks noGrp="1" noRot="1" noChangeAspect="1" noMove="1" noResize="1" noEditPoints="1" noAdjustHandles="1" noChangeArrowheads="1" noChangeShapeType="1"/>
+              </p:cNvPicPr>
+              <p:nvPr/>
+            </p:nvPicPr>
+            <p:blipFill>
+              <a:blip r:embed="rId6"/>
+              <a:stretch>
+                <a:fillRect/>
+              </a:stretch>
+            </p:blipFill>
+            <p:spPr>
+              <a:xfrm>
+                <a:off x="3679001" y="1724722"/>
+                <a:ext cx="373566" cy="395542"/>
+              </a:xfrm>
+              <a:prstGeom prst="rect">
+                <a:avLst/>
+              </a:prstGeom>
+              <a:noFill/>
+              <a:ln w="3175">
+                <a:noFill/>
+              </a:ln>
+            </p:spPr>
+          </p:pic>
+        </mc:Fallback>
+      </mc:AlternateContent>
+      <mc:AlternateContent xmlns:mc="http://schemas.openxmlformats.org/markup-compatibility/2006" xmlns:pslz="http://schemas.microsoft.com/office/powerpoint/2016/slidezoom">
+        <mc:Choice Requires="pslz">
+          <p:graphicFrame>
+            <p:nvGraphicFramePr>
+              <p:cNvPr id="6" name="Folienzoom 5">
+                <a:extLst>
+                  <a:ext uri="{FF2B5EF4-FFF2-40B4-BE49-F238E27FC236}">
+                    <a16:creationId xmlns:a16="http://schemas.microsoft.com/office/drawing/2014/main" id="{14BE5C24-AE7C-5E79-C854-95B295E89448}"/>
+                  </a:ext>
+                </a:extLst>
+              </p:cNvPr>
+              <p:cNvGraphicFramePr>
+                <a:graphicFrameLocks noChangeAspect="1"/>
+              </p:cNvGraphicFramePr>
+              <p:nvPr>
+                <p:extLst>
+                  <p:ext uri="{D42A27DB-BD31-4B8C-83A1-F6EECF244321}">
+                    <p14:modId xmlns:p14="http://schemas.microsoft.com/office/powerpoint/2010/main" val="2105362389"/>
+                  </p:ext>
+                </p:extLst>
+              </p:nvPr>
+            </p:nvGraphicFramePr>
+            <p:xfrm>
+              <a:off x="4463828" y="3248490"/>
+              <a:ext cx="373566" cy="395542"/>
+            </p:xfrm>
+            <a:graphic>
+              <a:graphicData uri="http://schemas.microsoft.com/office/powerpoint/2016/slidezoom">
+                <pslz:sldZm>
+                  <pslz:sldZmObj sldId="299" cId="2629472954">
+                    <pslz:zmPr id="{7DA5A6BA-102C-4A74-9E8C-7F7278862C04}" imageType="cover" transitionDur="1000">
+                      <p166:blipFill xmlns:p166="http://schemas.microsoft.com/office/powerpoint/2016/6/main">
+                        <a:blip r:embed="rId4"/>
+                        <a:stretch>
+                          <a:fillRect/>
+                        </a:stretch>
+                      </p166:blipFill>
+                      <p166:spPr xmlns:p166="http://schemas.microsoft.com/office/powerpoint/2016/6/main">
+                        <a:xfrm>
+                          <a:off x="0" y="0"/>
+                          <a:ext cx="373566" cy="395542"/>
+                        </a:xfrm>
+                        <a:prstGeom prst="rect">
+                          <a:avLst/>
+                        </a:prstGeom>
+                        <a:ln w="3175">
+                          <a:noFill/>
+                        </a:ln>
+                      </p166:spPr>
+                    </pslz:zmPr>
+                  </pslz:sldZmObj>
+                </pslz:sldZm>
+              </a:graphicData>
+            </a:graphic>
+          </p:graphicFrame>
+        </mc:Choice>
+        <mc:Fallback xmlns="">
+          <p:pic>
+            <p:nvPicPr>
+              <p:cNvPr id="6" name="Folienzoom 5">
+                <a:hlinkClick r:id="rId7" action="ppaction://hlinksldjump"/>
+                <a:extLst>
+                  <a:ext uri="{FF2B5EF4-FFF2-40B4-BE49-F238E27FC236}">
+                    <a16:creationId xmlns:a16="http://schemas.microsoft.com/office/drawing/2014/main" id="{14BE5C24-AE7C-5E79-C854-95B295E89448}"/>
+                  </a:ext>
+                </a:extLst>
+              </p:cNvPr>
+              <p:cNvPicPr>
+                <a:picLocks noGrp="1" noRot="1" noChangeAspect="1" noMove="1" noResize="1" noEditPoints="1" noAdjustHandles="1" noChangeArrowheads="1" noChangeShapeType="1"/>
+              </p:cNvPicPr>
+              <p:nvPr/>
+            </p:nvPicPr>
+            <p:blipFill>
+              <a:blip r:embed="rId6"/>
+              <a:stretch>
+                <a:fillRect/>
+              </a:stretch>
+            </p:blipFill>
+            <p:spPr>
+              <a:xfrm>
+                <a:off x="4463828" y="3248490"/>
+                <a:ext cx="373566" cy="395542"/>
+              </a:xfrm>
+              <a:prstGeom prst="rect">
+                <a:avLst/>
+              </a:prstGeom>
+              <a:ln w="3175">
+                <a:noFill/>
+              </a:ln>
+            </p:spPr>
+          </p:pic>
+        </mc:Fallback>
+      </mc:AlternateContent>
+      <p:pic>
+        <p:nvPicPr>
+          <p:cNvPr id="7" name="Grafik3">
             <a:extLst>
               <a:ext uri="{FF2B5EF4-FFF2-40B4-BE49-F238E27FC236}">
-                <a16:creationId xmlns:a16="http://schemas.microsoft.com/office/drawing/2014/main" id="{CDC00721-A05C-2C9C-64F3-E4AA6A7CBA6E}"/>
+                <a16:creationId xmlns:a16="http://schemas.microsoft.com/office/drawing/2014/main" id="{0DBA1698-B22C-CFB5-42BA-DA7C74A17522}"/>
               </a:ext>
             </a:extLst>
           </p:cNvPr>
-          <p:cNvSpPr>
-            <a:spLocks noGrp="1"/>
-          </p:cNvSpPr>
-          <p:nvPr>
-            <p:ph type="sldNum" sz="quarter" idx="4"/>
-          </p:nvPr>
+          <p:cNvPicPr>
+            <a:picLocks noChangeAspect="1"/>
+          </p:cNvPicPr>
+          <p:nvPr/>
+        </p:nvPicPr>
+        <p:blipFill>
+          <a:blip r:embed="rId8"/>
+          <a:srcRect l="5020" t="5194" r="5020" b="10270"/>
+          <a:stretch>
+            <a:fillRect/>
+          </a:stretch>
+        </p:blipFill>
+        <p:spPr bwMode="auto">
+          <a:xfrm>
+            <a:off x="0" y="4653915"/>
+            <a:ext cx="1238250" cy="489585"/>
+          </a:xfrm>
+          <a:prstGeom prst="rect">
+            <a:avLst/>
+          </a:prstGeom>
+        </p:spPr>
+      </p:pic>
+      <p:pic>
+        <p:nvPicPr>
+          <p:cNvPr id="9" name="Grafik2">
+            <a:extLst>
+              <a:ext uri="{FF2B5EF4-FFF2-40B4-BE49-F238E27FC236}">
+                <a16:creationId xmlns:a16="http://schemas.microsoft.com/office/drawing/2014/main" id="{FD86392F-3875-798A-DDFB-1CCFD5EA976B}"/>
+              </a:ext>
+            </a:extLst>
+          </p:cNvPr>
+          <p:cNvPicPr>
+            <a:picLocks noChangeAspect="1"/>
+          </p:cNvPicPr>
+          <p:nvPr/>
+        </p:nvPicPr>
+        <p:blipFill>
+          <a:blip r:embed="rId9"/>
+          <a:stretch>
+            <a:fillRect/>
+          </a:stretch>
+        </p:blipFill>
+        <p:spPr bwMode="auto">
+          <a:xfrm>
+            <a:off x="163376" y="259331"/>
+            <a:ext cx="1259840" cy="345440"/>
+          </a:xfrm>
+          <a:prstGeom prst="rect">
+            <a:avLst/>
+          </a:prstGeom>
+        </p:spPr>
+      </p:pic>
+      <p:sp>
+        <p:nvSpPr>
+          <p:cNvPr id="11" name="Rechteck 10">
+            <a:extLst>
+              <a:ext uri="{FF2B5EF4-FFF2-40B4-BE49-F238E27FC236}">
+                <a16:creationId xmlns:a16="http://schemas.microsoft.com/office/drawing/2014/main" id="{A72278F2-8046-D33E-A6B6-ADBD7E0444A8}"/>
+              </a:ext>
+            </a:extLst>
+          </p:cNvPr>
+          <p:cNvSpPr/>
+          <p:nvPr/>
         </p:nvSpPr>
-        <p:spPr/>
+        <p:spPr>
+          <a:xfrm>
+            <a:off x="3858322" y="292996"/>
+            <a:ext cx="1219200" cy="303158"/>
+          </a:xfrm>
+          <a:prstGeom prst="rect">
+            <a:avLst/>
+          </a:prstGeom>
+          <a:solidFill>
+            <a:schemeClr val="bg1"/>
+          </a:solidFill>
+          <a:ln>
+            <a:solidFill>
+              <a:schemeClr val="bg1"/>
+            </a:solidFill>
+          </a:ln>
+          <a:effectLst/>
+        </p:spPr>
+        <p:style>
+          <a:lnRef idx="1">
+            <a:schemeClr val="accent6"/>
+          </a:lnRef>
+          <a:fillRef idx="2">
+            <a:schemeClr val="accent6"/>
+          </a:fillRef>
+          <a:effectRef idx="1">
+            <a:schemeClr val="accent6"/>
+          </a:effectRef>
+          <a:fontRef idx="minor">
+            <a:schemeClr val="dk1"/>
+          </a:fontRef>
+        </p:style>
         <p:txBody>
-          <a:bodyPr/>
+          <a:bodyPr rtlCol="0" anchor="ctr"/>
           <a:lstStyle/>
           <a:p>
-            <a:pPr>
-              <a:defRPr/>
-            </a:pPr>
-            <a:fld id="{248790C2-FB8D-4AD1-BFB1-8D82BB9A4283}" type="slidenum">
-              <a:rPr lang="de-DE" altLang="de-DE" sz="1000" smtClean="0">
-                <a:solidFill>
-                  <a:srgbClr val="D8413E"/>
-                </a:solidFill>
-                <a:latin typeface="Arial" panose="020B0604020202020204" pitchFamily="34" charset="0"/>
-                <a:cs typeface="Arial" panose="020B0604020202020204" pitchFamily="34" charset="0"/>
-              </a:rPr>
-              <a:pPr>
-                <a:defRPr/>
-              </a:pPr>
-              <a:t>4</a:t>
-            </a:fld>
-            <a:endParaRPr lang="de-DE" altLang="de-DE" sz="1000" dirty="0">
-              <a:solidFill>
-                <a:srgbClr val="D8413E"/>
-              </a:solidFill>
-              <a:latin typeface="Arial" panose="020B0604020202020204" pitchFamily="34" charset="0"/>
-              <a:cs typeface="Arial" panose="020B0604020202020204" pitchFamily="34" charset="0"/>
-            </a:endParaRPr>
+            <a:pPr algn="ctr"/>
+            <a:endParaRPr lang="de-DE"/>
           </a:p>
         </p:txBody>
       </p:sp>
     </p:spTree>
     <p:extLst>
       <p:ext uri="{BB962C8B-B14F-4D97-AF65-F5344CB8AC3E}">
-        <p14:creationId xmlns:p14="http://schemas.microsoft.com/office/powerpoint/2010/main" val="1584555603"/>
+        <p14:creationId xmlns:p14="http://schemas.microsoft.com/office/powerpoint/2010/main" val="846346072"/>
       </p:ext>
     </p:extLst>
   </p:cSld>
@@ -5408,6 +6960,643 @@
 </file>
 
 <file path=ppt/slides/slide5.xml><?xml version="1.0" encoding="utf-8"?>
+<p:sld xmlns:a="http://schemas.openxmlformats.org/drawingml/2006/main" xmlns:r="http://schemas.openxmlformats.org/officeDocument/2006/relationships" xmlns:p="http://schemas.openxmlformats.org/presentationml/2006/main">
+  <p:cSld>
+    <p:spTree>
+      <p:nvGrpSpPr>
+        <p:cNvPr id="1" name=""/>
+        <p:cNvGrpSpPr/>
+        <p:nvPr/>
+      </p:nvGrpSpPr>
+      <p:grpSpPr>
+        <a:xfrm>
+          <a:off x="0" y="0"/>
+          <a:ext cx="0" cy="0"/>
+          <a:chOff x="0" y="0"/>
+          <a:chExt cx="0" cy="0"/>
+        </a:xfrm>
+      </p:grpSpPr>
+      <p:pic>
+        <p:nvPicPr>
+          <p:cNvPr id="6" name="Grafik3">
+            <a:extLst>
+              <a:ext uri="{FF2B5EF4-FFF2-40B4-BE49-F238E27FC236}">
+                <a16:creationId xmlns:a16="http://schemas.microsoft.com/office/drawing/2014/main" id="{13759A8C-2462-D04A-F701-FBB68388C9D4}"/>
+              </a:ext>
+            </a:extLst>
+          </p:cNvPr>
+          <p:cNvPicPr>
+            <a:picLocks noChangeAspect="1"/>
+          </p:cNvPicPr>
+          <p:nvPr/>
+        </p:nvPicPr>
+        <p:blipFill>
+          <a:blip r:embed="rId2"/>
+          <a:srcRect l="5020" t="5194" r="5020" b="10270"/>
+          <a:stretch>
+            <a:fillRect/>
+          </a:stretch>
+        </p:blipFill>
+        <p:spPr bwMode="auto">
+          <a:xfrm>
+            <a:off x="0" y="4653915"/>
+            <a:ext cx="1238250" cy="489585"/>
+          </a:xfrm>
+          <a:prstGeom prst="rect">
+            <a:avLst/>
+          </a:prstGeom>
+        </p:spPr>
+      </p:pic>
+      <p:pic>
+        <p:nvPicPr>
+          <p:cNvPr id="7" name="Grafik2">
+            <a:extLst>
+              <a:ext uri="{FF2B5EF4-FFF2-40B4-BE49-F238E27FC236}">
+                <a16:creationId xmlns:a16="http://schemas.microsoft.com/office/drawing/2014/main" id="{7280F2CB-9AFB-63C9-079E-F240C59FFC26}"/>
+              </a:ext>
+            </a:extLst>
+          </p:cNvPr>
+          <p:cNvPicPr>
+            <a:picLocks noChangeAspect="1"/>
+          </p:cNvPicPr>
+          <p:nvPr/>
+        </p:nvPicPr>
+        <p:blipFill>
+          <a:blip r:embed="rId3"/>
+          <a:stretch>
+            <a:fillRect/>
+          </a:stretch>
+        </p:blipFill>
+        <p:spPr bwMode="auto">
+          <a:xfrm>
+            <a:off x="163376" y="259331"/>
+            <a:ext cx="1259840" cy="345440"/>
+          </a:xfrm>
+          <a:prstGeom prst="rect">
+            <a:avLst/>
+          </a:prstGeom>
+        </p:spPr>
+      </p:pic>
+      <p:pic>
+        <p:nvPicPr>
+          <p:cNvPr id="4" name="Grafik 3" descr="Ein Bild, das Text, Screenshot enthält.&#10;&#10;Automatisch generierte Beschreibung">
+            <a:extLst>
+              <a:ext uri="{FF2B5EF4-FFF2-40B4-BE49-F238E27FC236}">
+                <a16:creationId xmlns:a16="http://schemas.microsoft.com/office/drawing/2014/main" id="{7AC30A80-BC7A-107B-DC1B-F56D379BD27D}"/>
+              </a:ext>
+            </a:extLst>
+          </p:cNvPr>
+          <p:cNvPicPr>
+            <a:picLocks noChangeAspect="1"/>
+          </p:cNvPicPr>
+          <p:nvPr/>
+        </p:nvPicPr>
+        <p:blipFill>
+          <a:blip r:embed="rId4"/>
+          <a:stretch>
+            <a:fillRect/>
+          </a:stretch>
+        </p:blipFill>
+        <p:spPr>
+          <a:xfrm>
+            <a:off x="1546789" y="384744"/>
+            <a:ext cx="6050422" cy="4461915"/>
+          </a:xfrm>
+          <a:prstGeom prst="rect">
+            <a:avLst/>
+          </a:prstGeom>
+        </p:spPr>
+      </p:pic>
+      <p:pic>
+        <p:nvPicPr>
+          <p:cNvPr id="5" name="Grafik 4">
+            <a:extLst>
+              <a:ext uri="{FF2B5EF4-FFF2-40B4-BE49-F238E27FC236}">
+                <a16:creationId xmlns:a16="http://schemas.microsoft.com/office/drawing/2014/main" id="{FF6FFE20-4812-7C4C-365E-905249720D3B}"/>
+              </a:ext>
+            </a:extLst>
+          </p:cNvPr>
+          <p:cNvPicPr>
+            <a:picLocks noChangeAspect="1"/>
+          </p:cNvPicPr>
+          <p:nvPr/>
+        </p:nvPicPr>
+        <p:blipFill>
+          <a:blip r:embed="rId5"/>
+          <a:stretch>
+            <a:fillRect/>
+          </a:stretch>
+        </p:blipFill>
+        <p:spPr>
+          <a:xfrm>
+            <a:off x="5648468" y="259331"/>
+            <a:ext cx="952381" cy="285714"/>
+          </a:xfrm>
+          <a:prstGeom prst="rect">
+            <a:avLst/>
+          </a:prstGeom>
+        </p:spPr>
+      </p:pic>
+    </p:spTree>
+    <p:extLst>
+      <p:ext uri="{BB962C8B-B14F-4D97-AF65-F5344CB8AC3E}">
+        <p14:creationId xmlns:p14="http://schemas.microsoft.com/office/powerpoint/2010/main" val="192380210"/>
+      </p:ext>
+    </p:extLst>
+  </p:cSld>
+  <p:clrMapOvr>
+    <a:masterClrMapping/>
+  </p:clrMapOvr>
+</p:sld>
+</file>
+
+<file path=ppt/slides/slide6.xml><?xml version="1.0" encoding="utf-8"?>
+<p:sld xmlns:a="http://schemas.openxmlformats.org/drawingml/2006/main" xmlns:r="http://schemas.openxmlformats.org/officeDocument/2006/relationships" xmlns:p="http://schemas.openxmlformats.org/presentationml/2006/main">
+  <p:cSld>
+    <p:spTree>
+      <p:nvGrpSpPr>
+        <p:cNvPr id="1" name=""/>
+        <p:cNvGrpSpPr/>
+        <p:nvPr/>
+      </p:nvGrpSpPr>
+      <p:grpSpPr>
+        <a:xfrm>
+          <a:off x="0" y="0"/>
+          <a:ext cx="0" cy="0"/>
+          <a:chOff x="0" y="0"/>
+          <a:chExt cx="0" cy="0"/>
+        </a:xfrm>
+      </p:grpSpPr>
+      <p:pic>
+        <p:nvPicPr>
+          <p:cNvPr id="5" name="Grafik 4" descr="Ein Bild, das Text, Screenshot, Design enthält.&#10;&#10;Automatisch generierte Beschreibung">
+            <a:extLst>
+              <a:ext uri="{FF2B5EF4-FFF2-40B4-BE49-F238E27FC236}">
+                <a16:creationId xmlns:a16="http://schemas.microsoft.com/office/drawing/2014/main" id="{41AF5383-F928-84E7-E9E7-929BE600F7DF}"/>
+              </a:ext>
+            </a:extLst>
+          </p:cNvPr>
+          <p:cNvPicPr>
+            <a:picLocks noChangeAspect="1"/>
+          </p:cNvPicPr>
+          <p:nvPr/>
+        </p:nvPicPr>
+        <p:blipFill>
+          <a:blip r:embed="rId2"/>
+          <a:stretch>
+            <a:fillRect/>
+          </a:stretch>
+        </p:blipFill>
+        <p:spPr>
+          <a:xfrm>
+            <a:off x="1894739" y="527601"/>
+            <a:ext cx="5354521" cy="4549286"/>
+          </a:xfrm>
+          <a:prstGeom prst="rect">
+            <a:avLst/>
+          </a:prstGeom>
+        </p:spPr>
+      </p:pic>
+      <p:pic>
+        <p:nvPicPr>
+          <p:cNvPr id="6" name="Grafik 5">
+            <a:extLst>
+              <a:ext uri="{FF2B5EF4-FFF2-40B4-BE49-F238E27FC236}">
+                <a16:creationId xmlns:a16="http://schemas.microsoft.com/office/drawing/2014/main" id="{5E5B29FA-E714-BB97-94B9-0F1C6BB63EED}"/>
+              </a:ext>
+            </a:extLst>
+          </p:cNvPr>
+          <p:cNvPicPr>
+            <a:picLocks noChangeAspect="1"/>
+          </p:cNvPicPr>
+          <p:nvPr/>
+        </p:nvPicPr>
+        <p:blipFill>
+          <a:blip r:embed="rId3"/>
+          <a:stretch>
+            <a:fillRect/>
+          </a:stretch>
+        </p:blipFill>
+        <p:spPr>
+          <a:xfrm>
+            <a:off x="5648468" y="259331"/>
+            <a:ext cx="952381" cy="285714"/>
+          </a:xfrm>
+          <a:prstGeom prst="rect">
+            <a:avLst/>
+          </a:prstGeom>
+        </p:spPr>
+      </p:pic>
+      <p:pic>
+        <p:nvPicPr>
+          <p:cNvPr id="7" name="Grafik3">
+            <a:extLst>
+              <a:ext uri="{FF2B5EF4-FFF2-40B4-BE49-F238E27FC236}">
+                <a16:creationId xmlns:a16="http://schemas.microsoft.com/office/drawing/2014/main" id="{37ADCD0A-AD00-6EE9-F287-2B24623FE15E}"/>
+              </a:ext>
+            </a:extLst>
+          </p:cNvPr>
+          <p:cNvPicPr>
+            <a:picLocks noChangeAspect="1"/>
+          </p:cNvPicPr>
+          <p:nvPr/>
+        </p:nvPicPr>
+        <p:blipFill>
+          <a:blip r:embed="rId4"/>
+          <a:srcRect l="5020" t="5194" r="5020" b="10270"/>
+          <a:stretch>
+            <a:fillRect/>
+          </a:stretch>
+        </p:blipFill>
+        <p:spPr bwMode="auto">
+          <a:xfrm>
+            <a:off x="0" y="4653915"/>
+            <a:ext cx="1238250" cy="489585"/>
+          </a:xfrm>
+          <a:prstGeom prst="rect">
+            <a:avLst/>
+          </a:prstGeom>
+        </p:spPr>
+      </p:pic>
+      <p:pic>
+        <p:nvPicPr>
+          <p:cNvPr id="8" name="Grafik2">
+            <a:extLst>
+              <a:ext uri="{FF2B5EF4-FFF2-40B4-BE49-F238E27FC236}">
+                <a16:creationId xmlns:a16="http://schemas.microsoft.com/office/drawing/2014/main" id="{2768A97C-FCCC-0487-2E14-5FBDDBB3569C}"/>
+              </a:ext>
+            </a:extLst>
+          </p:cNvPr>
+          <p:cNvPicPr>
+            <a:picLocks noChangeAspect="1"/>
+          </p:cNvPicPr>
+          <p:nvPr/>
+        </p:nvPicPr>
+        <p:blipFill>
+          <a:blip r:embed="rId5"/>
+          <a:stretch>
+            <a:fillRect/>
+          </a:stretch>
+        </p:blipFill>
+        <p:spPr bwMode="auto">
+          <a:xfrm>
+            <a:off x="163376" y="259331"/>
+            <a:ext cx="1259840" cy="345440"/>
+          </a:xfrm>
+          <a:prstGeom prst="rect">
+            <a:avLst/>
+          </a:prstGeom>
+        </p:spPr>
+      </p:pic>
+    </p:spTree>
+    <p:extLst>
+      <p:ext uri="{BB962C8B-B14F-4D97-AF65-F5344CB8AC3E}">
+        <p14:creationId xmlns:p14="http://schemas.microsoft.com/office/powerpoint/2010/main" val="2629472954"/>
+      </p:ext>
+    </p:extLst>
+  </p:cSld>
+  <p:clrMapOvr>
+    <a:masterClrMapping/>
+  </p:clrMapOvr>
+</p:sld>
+</file>
+
+<file path=ppt/slides/slide7.xml><?xml version="1.0" encoding="utf-8"?>
+<p:sld xmlns:a="http://schemas.openxmlformats.org/drawingml/2006/main" xmlns:r="http://schemas.openxmlformats.org/officeDocument/2006/relationships" xmlns:p="http://schemas.openxmlformats.org/presentationml/2006/main">
+  <p:cSld>
+    <p:spTree>
+      <p:nvGrpSpPr>
+        <p:cNvPr id="1" name=""/>
+        <p:cNvGrpSpPr/>
+        <p:nvPr/>
+      </p:nvGrpSpPr>
+      <p:grpSpPr>
+        <a:xfrm>
+          <a:off x="0" y="0"/>
+          <a:ext cx="0" cy="0"/>
+          <a:chOff x="0" y="0"/>
+          <a:chExt cx="0" cy="0"/>
+        </a:xfrm>
+      </p:grpSpPr>
+      <p:pic>
+        <p:nvPicPr>
+          <p:cNvPr id="2" name="Grafik 1" descr="Ein Bild, das Text, Screenshot, Schrift, Zahl enthält.&#10;&#10;Automatisch generierte Beschreibung">
+            <a:extLst>
+              <a:ext uri="{FF2B5EF4-FFF2-40B4-BE49-F238E27FC236}">
+                <a16:creationId xmlns:a16="http://schemas.microsoft.com/office/drawing/2014/main" id="{81EF2F16-6FC5-A5C1-E5C7-1010FDE411C9}"/>
+              </a:ext>
+            </a:extLst>
+          </p:cNvPr>
+          <p:cNvPicPr>
+            <a:picLocks noChangeAspect="1"/>
+          </p:cNvPicPr>
+          <p:nvPr/>
+        </p:nvPicPr>
+        <p:blipFill>
+          <a:blip r:embed="rId2"/>
+          <a:stretch>
+            <a:fillRect/>
+          </a:stretch>
+        </p:blipFill>
+        <p:spPr>
+          <a:xfrm>
+            <a:off x="1547973" y="241887"/>
+            <a:ext cx="6048054" cy="4901613"/>
+          </a:xfrm>
+          <a:prstGeom prst="rect">
+            <a:avLst/>
+          </a:prstGeom>
+        </p:spPr>
+      </p:pic>
+      <p:sp>
+        <p:nvSpPr>
+          <p:cNvPr id="4" name="Rechteck 3">
+            <a:extLst>
+              <a:ext uri="{FF2B5EF4-FFF2-40B4-BE49-F238E27FC236}">
+                <a16:creationId xmlns:a16="http://schemas.microsoft.com/office/drawing/2014/main" id="{01397307-01D6-D821-293A-DC0D88EA3149}"/>
+              </a:ext>
+            </a:extLst>
+          </p:cNvPr>
+          <p:cNvSpPr/>
+          <p:nvPr/>
+        </p:nvSpPr>
+        <p:spPr>
+          <a:xfrm>
+            <a:off x="1547973" y="4217028"/>
+            <a:ext cx="5611110" cy="466485"/>
+          </a:xfrm>
+          <a:prstGeom prst="rect">
+            <a:avLst/>
+          </a:prstGeom>
+          <a:solidFill>
+            <a:srgbClr val="92D050">
+              <a:alpha val="30000"/>
+            </a:srgbClr>
+          </a:solidFill>
+          <a:ln>
+            <a:noFill/>
+          </a:ln>
+          <a:effectLst/>
+        </p:spPr>
+        <p:style>
+          <a:lnRef idx="1">
+            <a:schemeClr val="accent1"/>
+          </a:lnRef>
+          <a:fillRef idx="3">
+            <a:schemeClr val="accent1"/>
+          </a:fillRef>
+          <a:effectRef idx="2">
+            <a:schemeClr val="accent1"/>
+          </a:effectRef>
+          <a:fontRef idx="minor">
+            <a:schemeClr val="lt1"/>
+          </a:fontRef>
+        </p:style>
+        <p:txBody>
+          <a:bodyPr rtlCol="0" anchor="ctr"/>
+          <a:lstStyle/>
+          <a:p>
+            <a:pPr algn="ctr"/>
+            <a:endParaRPr lang="de-DE"/>
+          </a:p>
+        </p:txBody>
+      </p:sp>
+      <p:pic>
+        <p:nvPicPr>
+          <p:cNvPr id="5" name="Grafik 4">
+            <a:extLst>
+              <a:ext uri="{FF2B5EF4-FFF2-40B4-BE49-F238E27FC236}">
+                <a16:creationId xmlns:a16="http://schemas.microsoft.com/office/drawing/2014/main" id="{CAC74AB0-9FFE-84AE-D1D8-0BA82A7EC684}"/>
+              </a:ext>
+            </a:extLst>
+          </p:cNvPr>
+          <p:cNvPicPr>
+            <a:picLocks noChangeAspect="1"/>
+          </p:cNvPicPr>
+          <p:nvPr/>
+        </p:nvPicPr>
+        <p:blipFill>
+          <a:blip r:embed="rId3"/>
+          <a:stretch>
+            <a:fillRect/>
+          </a:stretch>
+        </p:blipFill>
+        <p:spPr>
+          <a:xfrm>
+            <a:off x="5648468" y="259331"/>
+            <a:ext cx="952381" cy="285714"/>
+          </a:xfrm>
+          <a:prstGeom prst="rect">
+            <a:avLst/>
+          </a:prstGeom>
+        </p:spPr>
+      </p:pic>
+      <p:pic>
+        <p:nvPicPr>
+          <p:cNvPr id="6" name="Grafik3">
+            <a:extLst>
+              <a:ext uri="{FF2B5EF4-FFF2-40B4-BE49-F238E27FC236}">
+                <a16:creationId xmlns:a16="http://schemas.microsoft.com/office/drawing/2014/main" id="{4131E43D-685E-263A-FE64-975484AF4410}"/>
+              </a:ext>
+            </a:extLst>
+          </p:cNvPr>
+          <p:cNvPicPr>
+            <a:picLocks noChangeAspect="1"/>
+          </p:cNvPicPr>
+          <p:nvPr/>
+        </p:nvPicPr>
+        <p:blipFill>
+          <a:blip r:embed="rId4"/>
+          <a:srcRect l="5020" t="5194" r="5020" b="10270"/>
+          <a:stretch>
+            <a:fillRect/>
+          </a:stretch>
+        </p:blipFill>
+        <p:spPr bwMode="auto">
+          <a:xfrm>
+            <a:off x="0" y="4653915"/>
+            <a:ext cx="1238250" cy="489585"/>
+          </a:xfrm>
+          <a:prstGeom prst="rect">
+            <a:avLst/>
+          </a:prstGeom>
+        </p:spPr>
+      </p:pic>
+      <p:pic>
+        <p:nvPicPr>
+          <p:cNvPr id="7" name="Grafik2">
+            <a:extLst>
+              <a:ext uri="{FF2B5EF4-FFF2-40B4-BE49-F238E27FC236}">
+                <a16:creationId xmlns:a16="http://schemas.microsoft.com/office/drawing/2014/main" id="{494BAABB-8A3A-B929-5357-06EA6BD559EB}"/>
+              </a:ext>
+            </a:extLst>
+          </p:cNvPr>
+          <p:cNvPicPr>
+            <a:picLocks noChangeAspect="1"/>
+          </p:cNvPicPr>
+          <p:nvPr/>
+        </p:nvPicPr>
+        <p:blipFill>
+          <a:blip r:embed="rId5"/>
+          <a:stretch>
+            <a:fillRect/>
+          </a:stretch>
+        </p:blipFill>
+        <p:spPr bwMode="auto">
+          <a:xfrm>
+            <a:off x="163376" y="259331"/>
+            <a:ext cx="1259840" cy="345440"/>
+          </a:xfrm>
+          <a:prstGeom prst="rect">
+            <a:avLst/>
+          </a:prstGeom>
+        </p:spPr>
+      </p:pic>
+      <p:sp>
+        <p:nvSpPr>
+          <p:cNvPr id="8" name="Rechteck 7">
+            <a:extLst>
+              <a:ext uri="{FF2B5EF4-FFF2-40B4-BE49-F238E27FC236}">
+                <a16:creationId xmlns:a16="http://schemas.microsoft.com/office/drawing/2014/main" id="{B13F81FE-6CFB-3D92-C262-8F8C1146E0D5}"/>
+              </a:ext>
+            </a:extLst>
+          </p:cNvPr>
+          <p:cNvSpPr/>
+          <p:nvPr/>
+        </p:nvSpPr>
+        <p:spPr>
+          <a:xfrm>
+            <a:off x="3858322" y="292996"/>
+            <a:ext cx="1219200" cy="303158"/>
+          </a:xfrm>
+          <a:prstGeom prst="rect">
+            <a:avLst/>
+          </a:prstGeom>
+          <a:solidFill>
+            <a:schemeClr val="bg1"/>
+          </a:solidFill>
+          <a:ln>
+            <a:solidFill>
+              <a:schemeClr val="bg1"/>
+            </a:solidFill>
+          </a:ln>
+          <a:effectLst/>
+        </p:spPr>
+        <p:style>
+          <a:lnRef idx="1">
+            <a:schemeClr val="accent6"/>
+          </a:lnRef>
+          <a:fillRef idx="2">
+            <a:schemeClr val="accent6"/>
+          </a:fillRef>
+          <a:effectRef idx="1">
+            <a:schemeClr val="accent6"/>
+          </a:effectRef>
+          <a:fontRef idx="minor">
+            <a:schemeClr val="dk1"/>
+          </a:fontRef>
+        </p:style>
+        <p:txBody>
+          <a:bodyPr rtlCol="0" anchor="ctr"/>
+          <a:lstStyle/>
+          <a:p>
+            <a:pPr algn="ctr"/>
+            <a:endParaRPr lang="de-DE"/>
+          </a:p>
+        </p:txBody>
+      </p:sp>
+    </p:spTree>
+    <p:extLst>
+      <p:ext uri="{BB962C8B-B14F-4D97-AF65-F5344CB8AC3E}">
+        <p14:creationId xmlns:p14="http://schemas.microsoft.com/office/powerpoint/2010/main" val="326256863"/>
+      </p:ext>
+    </p:extLst>
+  </p:cSld>
+  <p:clrMapOvr>
+    <a:masterClrMapping/>
+  </p:clrMapOvr>
+  <p:timing>
+    <p:tnLst>
+      <p:par>
+        <p:cTn id="1" dur="indefinite" restart="never" nodeType="tmRoot">
+          <p:childTnLst>
+            <p:seq concurrent="1" nextAc="seek">
+              <p:cTn id="2" dur="indefinite" nodeType="mainSeq">
+                <p:childTnLst>
+                  <p:par>
+                    <p:cTn id="3" fill="hold">
+                      <p:stCondLst>
+                        <p:cond delay="indefinite"/>
+                      </p:stCondLst>
+                      <p:childTnLst>
+                        <p:par>
+                          <p:cTn id="4" fill="hold">
+                            <p:stCondLst>
+                              <p:cond delay="0"/>
+                            </p:stCondLst>
+                            <p:childTnLst>
+                              <p:par>
+                                <p:cTn id="5" presetID="1" presetClass="entr" presetSubtype="0" fill="hold" grpId="0" nodeType="clickEffect">
+                                  <p:stCondLst>
+                                    <p:cond delay="0"/>
+                                  </p:stCondLst>
+                                  <p:childTnLst>
+                                    <p:set>
+                                      <p:cBhvr>
+                                        <p:cTn id="6" dur="1" fill="hold">
+                                          <p:stCondLst>
+                                            <p:cond delay="0"/>
+                                          </p:stCondLst>
+                                        </p:cTn>
+                                        <p:tgtEl>
+                                          <p:spTgt spid="4"/>
+                                        </p:tgtEl>
+                                        <p:attrNameLst>
+                                          <p:attrName>style.visibility</p:attrName>
+                                        </p:attrNameLst>
+                                      </p:cBhvr>
+                                      <p:to>
+                                        <p:strVal val="visible"/>
+                                      </p:to>
+                                    </p:set>
+                                  </p:childTnLst>
+                                </p:cTn>
+                              </p:par>
+                            </p:childTnLst>
+                          </p:cTn>
+                        </p:par>
+                      </p:childTnLst>
+                    </p:cTn>
+                  </p:par>
+                </p:childTnLst>
+              </p:cTn>
+              <p:prevCondLst>
+                <p:cond evt="onPrev" delay="0">
+                  <p:tgtEl>
+                    <p:sldTgt/>
+                  </p:tgtEl>
+                </p:cond>
+              </p:prevCondLst>
+              <p:nextCondLst>
+                <p:cond evt="onNext" delay="0">
+                  <p:tgtEl>
+                    <p:sldTgt/>
+                  </p:tgtEl>
+                </p:cond>
+              </p:nextCondLst>
+            </p:seq>
+          </p:childTnLst>
+        </p:cTn>
+      </p:par>
+    </p:tnLst>
+    <p:bldLst>
+      <p:bldP spid="4" grpId="0" animBg="1"/>
+    </p:bldLst>
+  </p:timing>
+</p:sld>
+</file>
+
+<file path=ppt/slides/slide8.xml><?xml version="1.0" encoding="utf-8"?>
 <p:sld xmlns:a="http://schemas.openxmlformats.org/drawingml/2006/main" xmlns:r="http://schemas.openxmlformats.org/officeDocument/2006/relationships" xmlns:p="http://schemas.openxmlformats.org/presentationml/2006/main">
   <p:cSld>
     <p:spTree>
@@ -5454,440 +7643,10 @@
       </p:sp>
       <p:sp>
         <p:nvSpPr>
-          <p:cNvPr id="7" name="Inhaltsplatzhalter 6">
-            <a:extLst>
-              <a:ext uri="{FF2B5EF4-FFF2-40B4-BE49-F238E27FC236}">
-                <a16:creationId xmlns:a16="http://schemas.microsoft.com/office/drawing/2014/main" id="{5B6AB6AD-74C2-31C6-D7E8-8D2CDA94841C}"/>
-              </a:ext>
-            </a:extLst>
-          </p:cNvPr>
-          <p:cNvSpPr>
-            <a:spLocks noGrp="1"/>
-          </p:cNvSpPr>
-          <p:nvPr>
-            <p:ph idx="1"/>
-          </p:nvPr>
-        </p:nvSpPr>
-        <p:spPr/>
-        <p:txBody>
-          <a:bodyPr/>
-          <a:lstStyle/>
-          <a:p>
-            <a:endParaRPr lang="de-DE" dirty="0"/>
-          </a:p>
-        </p:txBody>
-      </p:sp>
-      <p:sp>
-        <p:nvSpPr>
           <p:cNvPr id="5" name="Foliennummernplatzhalter 4">
             <a:extLst>
               <a:ext uri="{FF2B5EF4-FFF2-40B4-BE49-F238E27FC236}">
                 <a16:creationId xmlns:a16="http://schemas.microsoft.com/office/drawing/2014/main" id="{F40EAF1B-F443-109A-92C9-9830A8CDCE82}"/>
-              </a:ext>
-            </a:extLst>
-          </p:cNvPr>
-          <p:cNvSpPr>
-            <a:spLocks noGrp="1"/>
-          </p:cNvSpPr>
-          <p:nvPr>
-            <p:ph type="sldNum" sz="quarter" idx="4"/>
-          </p:nvPr>
-        </p:nvSpPr>
-        <p:spPr/>
-        <p:txBody>
-          <a:bodyPr/>
-          <a:lstStyle/>
-          <a:p>
-            <a:pPr>
-              <a:defRPr/>
-            </a:pPr>
-            <a:fld id="{248790C2-FB8D-4AD1-BFB1-8D82BB9A4283}" type="slidenum">
-              <a:rPr lang="de-DE" altLang="de-DE" sz="1000" smtClean="0">
-                <a:solidFill>
-                  <a:srgbClr val="D8413E"/>
-                </a:solidFill>
-                <a:latin typeface="Arial" panose="020B0604020202020204" pitchFamily="34" charset="0"/>
-                <a:cs typeface="Arial" panose="020B0604020202020204" pitchFamily="34" charset="0"/>
-              </a:rPr>
-              <a:pPr>
-                <a:defRPr/>
-              </a:pPr>
-              <a:t>5</a:t>
-            </a:fld>
-            <a:endParaRPr lang="de-DE" altLang="de-DE" sz="1000" dirty="0">
-              <a:solidFill>
-                <a:srgbClr val="D8413E"/>
-              </a:solidFill>
-              <a:latin typeface="Arial" panose="020B0604020202020204" pitchFamily="34" charset="0"/>
-              <a:cs typeface="Arial" panose="020B0604020202020204" pitchFamily="34" charset="0"/>
-            </a:endParaRPr>
-          </a:p>
-        </p:txBody>
-      </p:sp>
-    </p:spTree>
-    <p:extLst>
-      <p:ext uri="{BB962C8B-B14F-4D97-AF65-F5344CB8AC3E}">
-        <p14:creationId xmlns:p14="http://schemas.microsoft.com/office/powerpoint/2010/main" val="78258817"/>
-      </p:ext>
-    </p:extLst>
-  </p:cSld>
-  <p:clrMapOvr>
-    <a:masterClrMapping/>
-  </p:clrMapOvr>
-</p:sld>
-</file>
-
-<file path=ppt/slides/slide6.xml><?xml version="1.0" encoding="utf-8"?>
-<p:sld xmlns:a="http://schemas.openxmlformats.org/drawingml/2006/main" xmlns:r="http://schemas.openxmlformats.org/officeDocument/2006/relationships" xmlns:p="http://schemas.openxmlformats.org/presentationml/2006/main">
-  <p:cSld>
-    <p:spTree>
-      <p:nvGrpSpPr>
-        <p:cNvPr id="1" name=""/>
-        <p:cNvGrpSpPr/>
-        <p:nvPr/>
-      </p:nvGrpSpPr>
-      <p:grpSpPr>
-        <a:xfrm>
-          <a:off x="0" y="0"/>
-          <a:ext cx="0" cy="0"/>
-          <a:chOff x="0" y="0"/>
-          <a:chExt cx="0" cy="0"/>
-        </a:xfrm>
-      </p:grpSpPr>
-      <p:sp>
-        <p:nvSpPr>
-          <p:cNvPr id="6" name="Titel 5">
-            <a:extLst>
-              <a:ext uri="{FF2B5EF4-FFF2-40B4-BE49-F238E27FC236}">
-                <a16:creationId xmlns:a16="http://schemas.microsoft.com/office/drawing/2014/main" id="{B7137728-7FAB-64E4-FADB-C920D1D2F2AF}"/>
-              </a:ext>
-            </a:extLst>
-          </p:cNvPr>
-          <p:cNvSpPr>
-            <a:spLocks noGrp="1"/>
-          </p:cNvSpPr>
-          <p:nvPr>
-            <p:ph type="title"/>
-          </p:nvPr>
-        </p:nvSpPr>
-        <p:spPr/>
-        <p:txBody>
-          <a:bodyPr/>
-          <a:lstStyle/>
-          <a:p>
-            <a:r>
-              <a:rPr lang="de-DE" dirty="0"/>
-              <a:t>Lern- und Kompetenzziele</a:t>
-            </a:r>
-          </a:p>
-        </p:txBody>
-      </p:sp>
-      <p:sp>
-        <p:nvSpPr>
-          <p:cNvPr id="7" name="Inhaltsplatzhalter 6">
-            <a:extLst>
-              <a:ext uri="{FF2B5EF4-FFF2-40B4-BE49-F238E27FC236}">
-                <a16:creationId xmlns:a16="http://schemas.microsoft.com/office/drawing/2014/main" id="{E4027CA7-3104-5947-D795-764E28924B7C}"/>
-              </a:ext>
-            </a:extLst>
-          </p:cNvPr>
-          <p:cNvSpPr>
-            <a:spLocks noGrp="1"/>
-          </p:cNvSpPr>
-          <p:nvPr>
-            <p:ph idx="1"/>
-          </p:nvPr>
-        </p:nvSpPr>
-        <p:spPr/>
-        <p:txBody>
-          <a:bodyPr/>
-          <a:lstStyle/>
-          <a:p>
-            <a:endParaRPr lang="de-DE" dirty="0"/>
-          </a:p>
-        </p:txBody>
-      </p:sp>
-      <p:sp>
-        <p:nvSpPr>
-          <p:cNvPr id="5" name="Foliennummernplatzhalter 4">
-            <a:extLst>
-              <a:ext uri="{FF2B5EF4-FFF2-40B4-BE49-F238E27FC236}">
-                <a16:creationId xmlns:a16="http://schemas.microsoft.com/office/drawing/2014/main" id="{53A8983A-91A8-51DA-2CFA-5DF6227F9929}"/>
-              </a:ext>
-            </a:extLst>
-          </p:cNvPr>
-          <p:cNvSpPr>
-            <a:spLocks noGrp="1"/>
-          </p:cNvSpPr>
-          <p:nvPr>
-            <p:ph type="sldNum" sz="quarter" idx="4"/>
-          </p:nvPr>
-        </p:nvSpPr>
-        <p:spPr/>
-        <p:txBody>
-          <a:bodyPr/>
-          <a:lstStyle/>
-          <a:p>
-            <a:pPr>
-              <a:defRPr/>
-            </a:pPr>
-            <a:fld id="{248790C2-FB8D-4AD1-BFB1-8D82BB9A4283}" type="slidenum">
-              <a:rPr lang="de-DE" altLang="de-DE" sz="1000" smtClean="0">
-                <a:solidFill>
-                  <a:srgbClr val="D8413E"/>
-                </a:solidFill>
-                <a:latin typeface="Arial" panose="020B0604020202020204" pitchFamily="34" charset="0"/>
-                <a:cs typeface="Arial" panose="020B0604020202020204" pitchFamily="34" charset="0"/>
-              </a:rPr>
-              <a:pPr>
-                <a:defRPr/>
-              </a:pPr>
-              <a:t>6</a:t>
-            </a:fld>
-            <a:endParaRPr lang="de-DE" altLang="de-DE" sz="1000" dirty="0">
-              <a:solidFill>
-                <a:srgbClr val="D8413E"/>
-              </a:solidFill>
-              <a:latin typeface="Arial" panose="020B0604020202020204" pitchFamily="34" charset="0"/>
-              <a:cs typeface="Arial" panose="020B0604020202020204" pitchFamily="34" charset="0"/>
-            </a:endParaRPr>
-          </a:p>
-        </p:txBody>
-      </p:sp>
-    </p:spTree>
-    <p:extLst>
-      <p:ext uri="{BB962C8B-B14F-4D97-AF65-F5344CB8AC3E}">
-        <p14:creationId xmlns:p14="http://schemas.microsoft.com/office/powerpoint/2010/main" val="3104107190"/>
-      </p:ext>
-    </p:extLst>
-  </p:cSld>
-  <p:clrMapOvr>
-    <a:masterClrMapping/>
-  </p:clrMapOvr>
-</p:sld>
-</file>
-
-<file path=ppt/slides/slide7.xml><?xml version="1.0" encoding="utf-8"?>
-<p:sld xmlns:a="http://schemas.openxmlformats.org/drawingml/2006/main" xmlns:r="http://schemas.openxmlformats.org/officeDocument/2006/relationships" xmlns:p="http://schemas.openxmlformats.org/presentationml/2006/main">
-  <p:cSld>
-    <p:spTree>
-      <p:nvGrpSpPr>
-        <p:cNvPr id="1" name=""/>
-        <p:cNvGrpSpPr/>
-        <p:nvPr/>
-      </p:nvGrpSpPr>
-      <p:grpSpPr>
-        <a:xfrm>
-          <a:off x="0" y="0"/>
-          <a:ext cx="0" cy="0"/>
-          <a:chOff x="0" y="0"/>
-          <a:chExt cx="0" cy="0"/>
-        </a:xfrm>
-      </p:grpSpPr>
-      <p:sp>
-        <p:nvSpPr>
-          <p:cNvPr id="6" name="Titel 5">
-            <a:extLst>
-              <a:ext uri="{FF2B5EF4-FFF2-40B4-BE49-F238E27FC236}">
-                <a16:creationId xmlns:a16="http://schemas.microsoft.com/office/drawing/2014/main" id="{A6A70BC8-7AD3-AB14-11CC-228FF19A1656}"/>
-              </a:ext>
-            </a:extLst>
-          </p:cNvPr>
-          <p:cNvSpPr>
-            <a:spLocks noGrp="1"/>
-          </p:cNvSpPr>
-          <p:nvPr>
-            <p:ph type="title"/>
-          </p:nvPr>
-        </p:nvSpPr>
-        <p:spPr/>
-        <p:txBody>
-          <a:bodyPr/>
-          <a:lstStyle/>
-          <a:p>
-            <a:r>
-              <a:rPr lang="de-DE" dirty="0"/>
-              <a:t>Erprobung</a:t>
-            </a:r>
-          </a:p>
-        </p:txBody>
-      </p:sp>
-      <p:sp>
-        <p:nvSpPr>
-          <p:cNvPr id="7" name="Inhaltsplatzhalter 6">
-            <a:extLst>
-              <a:ext uri="{FF2B5EF4-FFF2-40B4-BE49-F238E27FC236}">
-                <a16:creationId xmlns:a16="http://schemas.microsoft.com/office/drawing/2014/main" id="{0A3BC093-175F-A405-A0A9-5B64BD7106B1}"/>
-              </a:ext>
-            </a:extLst>
-          </p:cNvPr>
-          <p:cNvSpPr>
-            <a:spLocks noGrp="1"/>
-          </p:cNvSpPr>
-          <p:nvPr>
-            <p:ph idx="1"/>
-          </p:nvPr>
-        </p:nvSpPr>
-        <p:spPr/>
-        <p:txBody>
-          <a:bodyPr/>
-          <a:lstStyle/>
-          <a:p>
-            <a:r>
-              <a:rPr lang="de-DE" dirty="0"/>
-              <a:t>Test in 7. und 9. Klasse</a:t>
-            </a:r>
-          </a:p>
-        </p:txBody>
-      </p:sp>
-      <p:sp>
-        <p:nvSpPr>
-          <p:cNvPr id="5" name="Foliennummernplatzhalter 4">
-            <a:extLst>
-              <a:ext uri="{FF2B5EF4-FFF2-40B4-BE49-F238E27FC236}">
-                <a16:creationId xmlns:a16="http://schemas.microsoft.com/office/drawing/2014/main" id="{EF5CB133-C741-7030-914C-08B3A00874E1}"/>
-              </a:ext>
-            </a:extLst>
-          </p:cNvPr>
-          <p:cNvSpPr>
-            <a:spLocks noGrp="1"/>
-          </p:cNvSpPr>
-          <p:nvPr>
-            <p:ph type="sldNum" sz="quarter" idx="4"/>
-          </p:nvPr>
-        </p:nvSpPr>
-        <p:spPr/>
-        <p:txBody>
-          <a:bodyPr/>
-          <a:lstStyle/>
-          <a:p>
-            <a:pPr>
-              <a:defRPr/>
-            </a:pPr>
-            <a:fld id="{248790C2-FB8D-4AD1-BFB1-8D82BB9A4283}" type="slidenum">
-              <a:rPr lang="de-DE" altLang="de-DE" sz="1000" smtClean="0">
-                <a:solidFill>
-                  <a:srgbClr val="D8413E"/>
-                </a:solidFill>
-                <a:latin typeface="Arial" panose="020B0604020202020204" pitchFamily="34" charset="0"/>
-                <a:cs typeface="Arial" panose="020B0604020202020204" pitchFamily="34" charset="0"/>
-              </a:rPr>
-              <a:pPr>
-                <a:defRPr/>
-              </a:pPr>
-              <a:t>7</a:t>
-            </a:fld>
-            <a:endParaRPr lang="de-DE" altLang="de-DE" sz="1000" dirty="0">
-              <a:solidFill>
-                <a:srgbClr val="D8413E"/>
-              </a:solidFill>
-              <a:latin typeface="Arial" panose="020B0604020202020204" pitchFamily="34" charset="0"/>
-              <a:cs typeface="Arial" panose="020B0604020202020204" pitchFamily="34" charset="0"/>
-            </a:endParaRPr>
-          </a:p>
-        </p:txBody>
-      </p:sp>
-    </p:spTree>
-    <p:extLst>
-      <p:ext uri="{BB962C8B-B14F-4D97-AF65-F5344CB8AC3E}">
-        <p14:creationId xmlns:p14="http://schemas.microsoft.com/office/powerpoint/2010/main" val="3987969237"/>
-      </p:ext>
-    </p:extLst>
-  </p:cSld>
-  <p:clrMapOvr>
-    <a:masterClrMapping/>
-  </p:clrMapOvr>
-</p:sld>
-</file>
-
-<file path=ppt/slides/slide8.xml><?xml version="1.0" encoding="utf-8"?>
-<p:sld xmlns:a="http://schemas.openxmlformats.org/drawingml/2006/main" xmlns:r="http://schemas.openxmlformats.org/officeDocument/2006/relationships" xmlns:p="http://schemas.openxmlformats.org/presentationml/2006/main">
-  <p:cSld>
-    <p:spTree>
-      <p:nvGrpSpPr>
-        <p:cNvPr id="1" name=""/>
-        <p:cNvGrpSpPr/>
-        <p:nvPr/>
-      </p:nvGrpSpPr>
-      <p:grpSpPr>
-        <a:xfrm>
-          <a:off x="0" y="0"/>
-          <a:ext cx="0" cy="0"/>
-          <a:chOff x="0" y="0"/>
-          <a:chExt cx="0" cy="0"/>
-        </a:xfrm>
-      </p:grpSpPr>
-      <p:sp>
-        <p:nvSpPr>
-          <p:cNvPr id="6" name="Titel 5">
-            <a:extLst>
-              <a:ext uri="{FF2B5EF4-FFF2-40B4-BE49-F238E27FC236}">
-                <a16:creationId xmlns:a16="http://schemas.microsoft.com/office/drawing/2014/main" id="{00D34ACA-B041-9660-B253-E228747BA63D}"/>
-              </a:ext>
-            </a:extLst>
-          </p:cNvPr>
-          <p:cNvSpPr>
-            <a:spLocks noGrp="1"/>
-          </p:cNvSpPr>
-          <p:nvPr>
-            <p:ph type="title"/>
-          </p:nvPr>
-        </p:nvSpPr>
-        <p:spPr/>
-        <p:txBody>
-          <a:bodyPr/>
-          <a:lstStyle/>
-          <a:p>
-            <a:r>
-              <a:rPr lang="de-DE" dirty="0"/>
-              <a:t>Zusammenfassung</a:t>
-            </a:r>
-          </a:p>
-        </p:txBody>
-      </p:sp>
-      <p:sp>
-        <p:nvSpPr>
-          <p:cNvPr id="7" name="Inhaltsplatzhalter 6">
-            <a:extLst>
-              <a:ext uri="{FF2B5EF4-FFF2-40B4-BE49-F238E27FC236}">
-                <a16:creationId xmlns:a16="http://schemas.microsoft.com/office/drawing/2014/main" id="{220E78AA-5184-6EA7-D9E1-50DE1B61196A}"/>
-              </a:ext>
-            </a:extLst>
-          </p:cNvPr>
-          <p:cNvSpPr>
-            <a:spLocks noGrp="1"/>
-          </p:cNvSpPr>
-          <p:nvPr>
-            <p:ph idx="1"/>
-          </p:nvPr>
-        </p:nvSpPr>
-        <p:spPr/>
-        <p:txBody>
-          <a:bodyPr/>
-          <a:lstStyle/>
-          <a:p>
-            <a:r>
-              <a:rPr lang="de-DE" dirty="0"/>
-              <a:t>Thema relevant und wichtig für die Zukunft der SuS</a:t>
-            </a:r>
-          </a:p>
-          <a:p>
-            <a:r>
-              <a:rPr lang="de-DE" dirty="0"/>
-              <a:t>Möglichkeit zur Verbesserung der Lernprozesses</a:t>
-            </a:r>
-          </a:p>
-          <a:p>
-            <a:endParaRPr lang="de-DE" dirty="0"/>
-          </a:p>
-        </p:txBody>
-      </p:sp>
-      <p:sp>
-        <p:nvSpPr>
-          <p:cNvPr id="5" name="Foliennummernplatzhalter 4">
-            <a:extLst>
-              <a:ext uri="{FF2B5EF4-FFF2-40B4-BE49-F238E27FC236}">
-                <a16:creationId xmlns:a16="http://schemas.microsoft.com/office/drawing/2014/main" id="{B8174E8E-8A1B-8791-0FBA-F33AAD7C9BBF}"/>
               </a:ext>
             </a:extLst>
           </p:cNvPr>
@@ -5929,16 +7688,640 @@
           </a:p>
         </p:txBody>
       </p:sp>
+      <p:pic>
+        <p:nvPicPr>
+          <p:cNvPr id="3" name="Grafik 2">
+            <a:extLst>
+              <a:ext uri="{FF2B5EF4-FFF2-40B4-BE49-F238E27FC236}">
+                <a16:creationId xmlns:a16="http://schemas.microsoft.com/office/drawing/2014/main" id="{B199E896-8761-3EA1-B636-553141D67670}"/>
+              </a:ext>
+            </a:extLst>
+          </p:cNvPr>
+          <p:cNvPicPr>
+            <a:picLocks noChangeAspect="1"/>
+          </p:cNvPicPr>
+          <p:nvPr/>
+        </p:nvPicPr>
+        <p:blipFill>
+          <a:blip r:embed="rId2"/>
+          <a:stretch>
+            <a:fillRect/>
+          </a:stretch>
+        </p:blipFill>
+        <p:spPr>
+          <a:xfrm>
+            <a:off x="1740310" y="1086138"/>
+            <a:ext cx="5663379" cy="3549425"/>
+          </a:xfrm>
+          <a:prstGeom prst="rect">
+            <a:avLst/>
+          </a:prstGeom>
+        </p:spPr>
+      </p:pic>
+      <p:sp>
+        <p:nvSpPr>
+          <p:cNvPr id="4" name="Rechteck 3">
+            <a:extLst>
+              <a:ext uri="{FF2B5EF4-FFF2-40B4-BE49-F238E27FC236}">
+                <a16:creationId xmlns:a16="http://schemas.microsoft.com/office/drawing/2014/main" id="{95F9E019-6D51-1F73-3CC8-BA7EA51EE0B9}"/>
+              </a:ext>
+            </a:extLst>
+          </p:cNvPr>
+          <p:cNvSpPr/>
+          <p:nvPr/>
+        </p:nvSpPr>
+        <p:spPr>
+          <a:xfrm>
+            <a:off x="1740310" y="1773799"/>
+            <a:ext cx="5519888" cy="680644"/>
+          </a:xfrm>
+          <a:prstGeom prst="rect">
+            <a:avLst/>
+          </a:prstGeom>
+          <a:solidFill>
+            <a:srgbClr val="92D050">
+              <a:alpha val="30000"/>
+            </a:srgbClr>
+          </a:solidFill>
+          <a:ln>
+            <a:noFill/>
+          </a:ln>
+          <a:effectLst/>
+        </p:spPr>
+        <p:style>
+          <a:lnRef idx="1">
+            <a:schemeClr val="accent1"/>
+          </a:lnRef>
+          <a:fillRef idx="3">
+            <a:schemeClr val="accent1"/>
+          </a:fillRef>
+          <a:effectRef idx="2">
+            <a:schemeClr val="accent1"/>
+          </a:effectRef>
+          <a:fontRef idx="minor">
+            <a:schemeClr val="lt1"/>
+          </a:fontRef>
+        </p:style>
+        <p:txBody>
+          <a:bodyPr rtlCol="0" anchor="ctr"/>
+          <a:lstStyle/>
+          <a:p>
+            <a:pPr algn="ctr"/>
+            <a:endParaRPr lang="de-DE"/>
+          </a:p>
+        </p:txBody>
+      </p:sp>
+      <p:sp>
+        <p:nvSpPr>
+          <p:cNvPr id="8" name="Rechteck 7">
+            <a:extLst>
+              <a:ext uri="{FF2B5EF4-FFF2-40B4-BE49-F238E27FC236}">
+                <a16:creationId xmlns:a16="http://schemas.microsoft.com/office/drawing/2014/main" id="{65A53D9E-6070-B22A-F42F-8C241D03A47F}"/>
+              </a:ext>
+            </a:extLst>
+          </p:cNvPr>
+          <p:cNvSpPr/>
+          <p:nvPr/>
+        </p:nvSpPr>
+        <p:spPr>
+          <a:xfrm>
+            <a:off x="1740310" y="3034999"/>
+            <a:ext cx="5519888" cy="370601"/>
+          </a:xfrm>
+          <a:prstGeom prst="rect">
+            <a:avLst/>
+          </a:prstGeom>
+          <a:solidFill>
+            <a:srgbClr val="92D050">
+              <a:alpha val="30000"/>
+            </a:srgbClr>
+          </a:solidFill>
+          <a:ln>
+            <a:noFill/>
+          </a:ln>
+          <a:effectLst/>
+        </p:spPr>
+        <p:style>
+          <a:lnRef idx="1">
+            <a:schemeClr val="accent1"/>
+          </a:lnRef>
+          <a:fillRef idx="3">
+            <a:schemeClr val="accent1"/>
+          </a:fillRef>
+          <a:effectRef idx="2">
+            <a:schemeClr val="accent1"/>
+          </a:effectRef>
+          <a:fontRef idx="minor">
+            <a:schemeClr val="lt1"/>
+          </a:fontRef>
+        </p:style>
+        <p:txBody>
+          <a:bodyPr rtlCol="0" anchor="ctr"/>
+          <a:lstStyle/>
+          <a:p>
+            <a:pPr algn="ctr"/>
+            <a:endParaRPr lang="de-DE"/>
+          </a:p>
+        </p:txBody>
+      </p:sp>
+      <p:sp>
+        <p:nvSpPr>
+          <p:cNvPr id="9" name="Rechteck 8">
+            <a:extLst>
+              <a:ext uri="{FF2B5EF4-FFF2-40B4-BE49-F238E27FC236}">
+                <a16:creationId xmlns:a16="http://schemas.microsoft.com/office/drawing/2014/main" id="{04B315A1-42E8-B43D-2B0D-F014ABA1E5B7}"/>
+              </a:ext>
+            </a:extLst>
+          </p:cNvPr>
+          <p:cNvSpPr/>
+          <p:nvPr/>
+        </p:nvSpPr>
+        <p:spPr>
+          <a:xfrm>
+            <a:off x="1740310" y="4392000"/>
+            <a:ext cx="5519888" cy="274800"/>
+          </a:xfrm>
+          <a:prstGeom prst="rect">
+            <a:avLst/>
+          </a:prstGeom>
+          <a:solidFill>
+            <a:srgbClr val="92D050">
+              <a:alpha val="30000"/>
+            </a:srgbClr>
+          </a:solidFill>
+          <a:ln>
+            <a:noFill/>
+          </a:ln>
+          <a:effectLst/>
+        </p:spPr>
+        <p:style>
+          <a:lnRef idx="1">
+            <a:schemeClr val="accent1"/>
+          </a:lnRef>
+          <a:fillRef idx="3">
+            <a:schemeClr val="accent1"/>
+          </a:fillRef>
+          <a:effectRef idx="2">
+            <a:schemeClr val="accent1"/>
+          </a:effectRef>
+          <a:fontRef idx="minor">
+            <a:schemeClr val="lt1"/>
+          </a:fontRef>
+        </p:style>
+        <p:txBody>
+          <a:bodyPr rtlCol="0" anchor="ctr"/>
+          <a:lstStyle/>
+          <a:p>
+            <a:pPr algn="ctr"/>
+            <a:endParaRPr lang="de-DE"/>
+          </a:p>
+        </p:txBody>
+      </p:sp>
     </p:spTree>
     <p:extLst>
       <p:ext uri="{BB962C8B-B14F-4D97-AF65-F5344CB8AC3E}">
-        <p14:creationId xmlns:p14="http://schemas.microsoft.com/office/powerpoint/2010/main" val="4256430367"/>
+        <p14:creationId xmlns:p14="http://schemas.microsoft.com/office/powerpoint/2010/main" val="78258817"/>
       </p:ext>
     </p:extLst>
   </p:cSld>
   <p:clrMapOvr>
     <a:masterClrMapping/>
   </p:clrMapOvr>
+  <p:timing>
+    <p:tnLst>
+      <p:par>
+        <p:cTn id="1" dur="indefinite" restart="never" nodeType="tmRoot">
+          <p:childTnLst>
+            <p:seq concurrent="1" nextAc="seek">
+              <p:cTn id="2" dur="indefinite" nodeType="mainSeq">
+                <p:childTnLst>
+                  <p:par>
+                    <p:cTn id="3" fill="hold">
+                      <p:stCondLst>
+                        <p:cond delay="indefinite"/>
+                      </p:stCondLst>
+                      <p:childTnLst>
+                        <p:par>
+                          <p:cTn id="4" fill="hold">
+                            <p:stCondLst>
+                              <p:cond delay="0"/>
+                            </p:stCondLst>
+                            <p:childTnLst>
+                              <p:par>
+                                <p:cTn id="5" presetID="1" presetClass="entr" presetSubtype="0" fill="hold" grpId="0" nodeType="clickEffect">
+                                  <p:stCondLst>
+                                    <p:cond delay="0"/>
+                                  </p:stCondLst>
+                                  <p:childTnLst>
+                                    <p:set>
+                                      <p:cBhvr>
+                                        <p:cTn id="6" dur="1" fill="hold">
+                                          <p:stCondLst>
+                                            <p:cond delay="0"/>
+                                          </p:stCondLst>
+                                        </p:cTn>
+                                        <p:tgtEl>
+                                          <p:spTgt spid="4"/>
+                                        </p:tgtEl>
+                                        <p:attrNameLst>
+                                          <p:attrName>style.visibility</p:attrName>
+                                        </p:attrNameLst>
+                                      </p:cBhvr>
+                                      <p:to>
+                                        <p:strVal val="visible"/>
+                                      </p:to>
+                                    </p:set>
+                                  </p:childTnLst>
+                                </p:cTn>
+                              </p:par>
+                            </p:childTnLst>
+                          </p:cTn>
+                        </p:par>
+                      </p:childTnLst>
+                    </p:cTn>
+                  </p:par>
+                  <p:par>
+                    <p:cTn id="7" fill="hold">
+                      <p:stCondLst>
+                        <p:cond delay="indefinite"/>
+                      </p:stCondLst>
+                      <p:childTnLst>
+                        <p:par>
+                          <p:cTn id="8" fill="hold">
+                            <p:stCondLst>
+                              <p:cond delay="0"/>
+                            </p:stCondLst>
+                            <p:childTnLst>
+                              <p:par>
+                                <p:cTn id="9" presetID="1" presetClass="entr" presetSubtype="0" fill="hold" grpId="0" nodeType="clickEffect">
+                                  <p:stCondLst>
+                                    <p:cond delay="0"/>
+                                  </p:stCondLst>
+                                  <p:childTnLst>
+                                    <p:set>
+                                      <p:cBhvr>
+                                        <p:cTn id="10" dur="1" fill="hold">
+                                          <p:stCondLst>
+                                            <p:cond delay="0"/>
+                                          </p:stCondLst>
+                                        </p:cTn>
+                                        <p:tgtEl>
+                                          <p:spTgt spid="8"/>
+                                        </p:tgtEl>
+                                        <p:attrNameLst>
+                                          <p:attrName>style.visibility</p:attrName>
+                                        </p:attrNameLst>
+                                      </p:cBhvr>
+                                      <p:to>
+                                        <p:strVal val="visible"/>
+                                      </p:to>
+                                    </p:set>
+                                  </p:childTnLst>
+                                </p:cTn>
+                              </p:par>
+                            </p:childTnLst>
+                          </p:cTn>
+                        </p:par>
+                      </p:childTnLst>
+                    </p:cTn>
+                  </p:par>
+                  <p:par>
+                    <p:cTn id="11" fill="hold">
+                      <p:stCondLst>
+                        <p:cond delay="indefinite"/>
+                      </p:stCondLst>
+                      <p:childTnLst>
+                        <p:par>
+                          <p:cTn id="12" fill="hold">
+                            <p:stCondLst>
+                              <p:cond delay="0"/>
+                            </p:stCondLst>
+                            <p:childTnLst>
+                              <p:par>
+                                <p:cTn id="13" presetID="1" presetClass="entr" presetSubtype="0" fill="hold" grpId="0" nodeType="clickEffect">
+                                  <p:stCondLst>
+                                    <p:cond delay="0"/>
+                                  </p:stCondLst>
+                                  <p:childTnLst>
+                                    <p:set>
+                                      <p:cBhvr>
+                                        <p:cTn id="14" dur="1" fill="hold">
+                                          <p:stCondLst>
+                                            <p:cond delay="0"/>
+                                          </p:stCondLst>
+                                        </p:cTn>
+                                        <p:tgtEl>
+                                          <p:spTgt spid="9"/>
+                                        </p:tgtEl>
+                                        <p:attrNameLst>
+                                          <p:attrName>style.visibility</p:attrName>
+                                        </p:attrNameLst>
+                                      </p:cBhvr>
+                                      <p:to>
+                                        <p:strVal val="visible"/>
+                                      </p:to>
+                                    </p:set>
+                                  </p:childTnLst>
+                                </p:cTn>
+                              </p:par>
+                            </p:childTnLst>
+                          </p:cTn>
+                        </p:par>
+                      </p:childTnLst>
+                    </p:cTn>
+                  </p:par>
+                </p:childTnLst>
+              </p:cTn>
+              <p:prevCondLst>
+                <p:cond evt="onPrev" delay="0">
+                  <p:tgtEl>
+                    <p:sldTgt/>
+                  </p:tgtEl>
+                </p:cond>
+              </p:prevCondLst>
+              <p:nextCondLst>
+                <p:cond evt="onNext" delay="0">
+                  <p:tgtEl>
+                    <p:sldTgt/>
+                  </p:tgtEl>
+                </p:cond>
+              </p:nextCondLst>
+            </p:seq>
+          </p:childTnLst>
+        </p:cTn>
+      </p:par>
+    </p:tnLst>
+    <p:bldLst>
+      <p:bldP spid="4" grpId="0" animBg="1"/>
+      <p:bldP spid="8" grpId="0" animBg="1"/>
+      <p:bldP spid="9" grpId="0" animBg="1"/>
+    </p:bldLst>
+  </p:timing>
+</p:sld>
+</file>
+
+<file path=ppt/slides/slide9.xml><?xml version="1.0" encoding="utf-8"?>
+<p:sld xmlns:a="http://schemas.openxmlformats.org/drawingml/2006/main" xmlns:r="http://schemas.openxmlformats.org/officeDocument/2006/relationships" xmlns:p="http://schemas.openxmlformats.org/presentationml/2006/main">
+  <p:cSld>
+    <p:spTree>
+      <p:nvGrpSpPr>
+        <p:cNvPr id="1" name=""/>
+        <p:cNvGrpSpPr/>
+        <p:nvPr/>
+      </p:nvGrpSpPr>
+      <p:grpSpPr>
+        <a:xfrm>
+          <a:off x="0" y="0"/>
+          <a:ext cx="0" cy="0"/>
+          <a:chOff x="0" y="0"/>
+          <a:chExt cx="0" cy="0"/>
+        </a:xfrm>
+      </p:grpSpPr>
+      <p:sp>
+        <p:nvSpPr>
+          <p:cNvPr id="6" name="Titel 5">
+            <a:extLst>
+              <a:ext uri="{FF2B5EF4-FFF2-40B4-BE49-F238E27FC236}">
+                <a16:creationId xmlns:a16="http://schemas.microsoft.com/office/drawing/2014/main" id="{535523DA-D3BD-CCBF-6D66-31D8BCCD42B5}"/>
+              </a:ext>
+            </a:extLst>
+          </p:cNvPr>
+          <p:cNvSpPr>
+            <a:spLocks noGrp="1"/>
+          </p:cNvSpPr>
+          <p:nvPr>
+            <p:ph type="title"/>
+          </p:nvPr>
+        </p:nvSpPr>
+        <p:spPr/>
+        <p:txBody>
+          <a:bodyPr/>
+          <a:lstStyle/>
+          <a:p>
+            <a:r>
+              <a:rPr lang="de-DE" dirty="0"/>
+              <a:t>Lehrplanbezug</a:t>
+            </a:r>
+          </a:p>
+        </p:txBody>
+      </p:sp>
+      <p:sp>
+        <p:nvSpPr>
+          <p:cNvPr id="5" name="Foliennummernplatzhalter 4">
+            <a:extLst>
+              <a:ext uri="{FF2B5EF4-FFF2-40B4-BE49-F238E27FC236}">
+                <a16:creationId xmlns:a16="http://schemas.microsoft.com/office/drawing/2014/main" id="{F40EAF1B-F443-109A-92C9-9830A8CDCE82}"/>
+              </a:ext>
+            </a:extLst>
+          </p:cNvPr>
+          <p:cNvSpPr>
+            <a:spLocks noGrp="1"/>
+          </p:cNvSpPr>
+          <p:nvPr>
+            <p:ph type="sldNum" sz="quarter" idx="4"/>
+          </p:nvPr>
+        </p:nvSpPr>
+        <p:spPr/>
+        <p:txBody>
+          <a:bodyPr/>
+          <a:lstStyle/>
+          <a:p>
+            <a:pPr>
+              <a:defRPr/>
+            </a:pPr>
+            <a:fld id="{248790C2-FB8D-4AD1-BFB1-8D82BB9A4283}" type="slidenum">
+              <a:rPr lang="de-DE" altLang="de-DE" sz="1000" smtClean="0">
+                <a:solidFill>
+                  <a:srgbClr val="D8413E"/>
+                </a:solidFill>
+                <a:latin typeface="Arial" panose="020B0604020202020204" pitchFamily="34" charset="0"/>
+                <a:cs typeface="Arial" panose="020B0604020202020204" pitchFamily="34" charset="0"/>
+              </a:rPr>
+              <a:pPr>
+                <a:defRPr/>
+              </a:pPr>
+              <a:t>9</a:t>
+            </a:fld>
+            <a:endParaRPr lang="de-DE" altLang="de-DE" sz="1000" dirty="0">
+              <a:solidFill>
+                <a:srgbClr val="D8413E"/>
+              </a:solidFill>
+              <a:latin typeface="Arial" panose="020B0604020202020204" pitchFamily="34" charset="0"/>
+              <a:cs typeface="Arial" panose="020B0604020202020204" pitchFamily="34" charset="0"/>
+            </a:endParaRPr>
+          </a:p>
+        </p:txBody>
+      </p:sp>
+      <p:pic>
+        <p:nvPicPr>
+          <p:cNvPr id="3" name="Grafik 2">
+            <a:extLst>
+              <a:ext uri="{FF2B5EF4-FFF2-40B4-BE49-F238E27FC236}">
+                <a16:creationId xmlns:a16="http://schemas.microsoft.com/office/drawing/2014/main" id="{B199E896-8761-3EA1-B636-553141D67670}"/>
+              </a:ext>
+            </a:extLst>
+          </p:cNvPr>
+          <p:cNvPicPr>
+            <a:picLocks noChangeAspect="1"/>
+          </p:cNvPicPr>
+          <p:nvPr/>
+        </p:nvPicPr>
+        <p:blipFill>
+          <a:blip r:embed="rId2"/>
+          <a:srcRect/>
+          <a:stretch/>
+        </p:blipFill>
+        <p:spPr>
+          <a:xfrm>
+            <a:off x="1381116" y="1355965"/>
+            <a:ext cx="6381767" cy="3230769"/>
+          </a:xfrm>
+          <a:prstGeom prst="rect">
+            <a:avLst/>
+          </a:prstGeom>
+        </p:spPr>
+      </p:pic>
+      <p:sp>
+        <p:nvSpPr>
+          <p:cNvPr id="2" name="Rechteck 1">
+            <a:extLst>
+              <a:ext uri="{FF2B5EF4-FFF2-40B4-BE49-F238E27FC236}">
+                <a16:creationId xmlns:a16="http://schemas.microsoft.com/office/drawing/2014/main" id="{5D192914-5221-E67E-B640-8C174BA6DC11}"/>
+              </a:ext>
+            </a:extLst>
+          </p:cNvPr>
+          <p:cNvSpPr/>
+          <p:nvPr/>
+        </p:nvSpPr>
+        <p:spPr>
+          <a:xfrm>
+            <a:off x="1452310" y="3960000"/>
+            <a:ext cx="6186890" cy="547199"/>
+          </a:xfrm>
+          <a:prstGeom prst="rect">
+            <a:avLst/>
+          </a:prstGeom>
+          <a:solidFill>
+            <a:srgbClr val="92D050">
+              <a:alpha val="30000"/>
+            </a:srgbClr>
+          </a:solidFill>
+          <a:ln>
+            <a:noFill/>
+          </a:ln>
+          <a:effectLst/>
+        </p:spPr>
+        <p:style>
+          <a:lnRef idx="1">
+            <a:schemeClr val="accent1"/>
+          </a:lnRef>
+          <a:fillRef idx="3">
+            <a:schemeClr val="accent1"/>
+          </a:fillRef>
+          <a:effectRef idx="2">
+            <a:schemeClr val="accent1"/>
+          </a:effectRef>
+          <a:fontRef idx="minor">
+            <a:schemeClr val="lt1"/>
+          </a:fontRef>
+        </p:style>
+        <p:txBody>
+          <a:bodyPr rtlCol="0" anchor="ctr"/>
+          <a:lstStyle/>
+          <a:p>
+            <a:pPr algn="ctr"/>
+            <a:endParaRPr lang="de-DE"/>
+          </a:p>
+        </p:txBody>
+      </p:sp>
+    </p:spTree>
+    <p:extLst>
+      <p:ext uri="{BB962C8B-B14F-4D97-AF65-F5344CB8AC3E}">
+        <p14:creationId xmlns:p14="http://schemas.microsoft.com/office/powerpoint/2010/main" val="3794989348"/>
+      </p:ext>
+    </p:extLst>
+  </p:cSld>
+  <p:clrMapOvr>
+    <a:masterClrMapping/>
+  </p:clrMapOvr>
+  <p:timing>
+    <p:tnLst>
+      <p:par>
+        <p:cTn id="1" dur="indefinite" restart="never" nodeType="tmRoot">
+          <p:childTnLst>
+            <p:seq concurrent="1" nextAc="seek">
+              <p:cTn id="2" dur="indefinite" nodeType="mainSeq">
+                <p:childTnLst>
+                  <p:par>
+                    <p:cTn id="3" fill="hold">
+                      <p:stCondLst>
+                        <p:cond delay="indefinite"/>
+                      </p:stCondLst>
+                      <p:childTnLst>
+                        <p:par>
+                          <p:cTn id="4" fill="hold">
+                            <p:stCondLst>
+                              <p:cond delay="0"/>
+                            </p:stCondLst>
+                            <p:childTnLst>
+                              <p:par>
+                                <p:cTn id="5" presetID="1" presetClass="entr" presetSubtype="0" fill="hold" grpId="0" nodeType="clickEffect">
+                                  <p:stCondLst>
+                                    <p:cond delay="0"/>
+                                  </p:stCondLst>
+                                  <p:childTnLst>
+                                    <p:set>
+                                      <p:cBhvr>
+                                        <p:cTn id="6" dur="1" fill="hold">
+                                          <p:stCondLst>
+                                            <p:cond delay="0"/>
+                                          </p:stCondLst>
+                                        </p:cTn>
+                                        <p:tgtEl>
+                                          <p:spTgt spid="2"/>
+                                        </p:tgtEl>
+                                        <p:attrNameLst>
+                                          <p:attrName>style.visibility</p:attrName>
+                                        </p:attrNameLst>
+                                      </p:cBhvr>
+                                      <p:to>
+                                        <p:strVal val="visible"/>
+                                      </p:to>
+                                    </p:set>
+                                  </p:childTnLst>
+                                </p:cTn>
+                              </p:par>
+                            </p:childTnLst>
+                          </p:cTn>
+                        </p:par>
+                      </p:childTnLst>
+                    </p:cTn>
+                  </p:par>
+                </p:childTnLst>
+              </p:cTn>
+              <p:prevCondLst>
+                <p:cond evt="onPrev" delay="0">
+                  <p:tgtEl>
+                    <p:sldTgt/>
+                  </p:tgtEl>
+                </p:cond>
+              </p:prevCondLst>
+              <p:nextCondLst>
+                <p:cond evt="onNext" delay="0">
+                  <p:tgtEl>
+                    <p:sldTgt/>
+                  </p:tgtEl>
+                </p:cond>
+              </p:nextCondLst>
+            </p:seq>
+          </p:childTnLst>
+        </p:cTn>
+      </p:par>
+    </p:tnLst>
+    <p:bldLst>
+      <p:bldP spid="2" grpId="0" animBg="1"/>
+    </p:bldLst>
+  </p:timing>
 </p:sld>
 </file>
 

</xml_diff>